<commit_message>
UP _ exo GAB maquette et diagramme navigabilité retirer de l'argent dans sa banque update add ecran patientez impression reçu
</commit_message>
<xml_diff>
--- a/FOAD_Unified_Process/GAB/maquettage et diagramme de navigabilité_GAB_retirer de l'argent dont s'identifier.pptx
+++ b/FOAD_Unified_Process/GAB/maquettage et diagramme de navigabilité_GAB_retirer de l'argent dont s'identifier.pptx
@@ -5,7 +5,7 @@
     <p:sldMasterId id="2147483648" r:id="rId1"/>
   </p:sldMasterIdLst>
   <p:notesMasterIdLst>
-    <p:notesMasterId r:id="rId20"/>
+    <p:notesMasterId r:id="rId21"/>
   </p:notesMasterIdLst>
   <p:sldIdLst>
     <p:sldId id="256" r:id="rId2"/>
@@ -22,10 +22,11 @@
     <p:sldId id="278" r:id="rId13"/>
     <p:sldId id="270" r:id="rId14"/>
     <p:sldId id="271" r:id="rId15"/>
-    <p:sldId id="272" r:id="rId16"/>
-    <p:sldId id="273" r:id="rId17"/>
-    <p:sldId id="274" r:id="rId18"/>
-    <p:sldId id="275" r:id="rId19"/>
+    <p:sldId id="280" r:id="rId16"/>
+    <p:sldId id="272" r:id="rId17"/>
+    <p:sldId id="273" r:id="rId18"/>
+    <p:sldId id="274" r:id="rId19"/>
+    <p:sldId id="275" r:id="rId20"/>
   </p:sldIdLst>
   <p:sldSz cx="12192000" cy="6858000"/>
   <p:notesSz cx="6858000" cy="9144000"/>
@@ -976,6 +977,90 @@
     <p:extLst>
       <p:ext uri="{BB962C8B-B14F-4D97-AF65-F5344CB8AC3E}">
         <p14:creationId xmlns:p14="http://schemas.microsoft.com/office/powerpoint/2010/main" val="375239402"/>
+      </p:ext>
+    </p:extLst>
+  </p:cSld>
+  <p:clrMapOvr>
+    <a:masterClrMapping/>
+  </p:clrMapOvr>
+</p:notes>
+</file>
+
+<file path=ppt/notesSlides/notesSlide7.xml><?xml version="1.0" encoding="utf-8"?>
+<p:notes xmlns:a="http://schemas.openxmlformats.org/drawingml/2006/main" xmlns:r="http://schemas.openxmlformats.org/officeDocument/2006/relationships" xmlns:p="http://schemas.openxmlformats.org/presentationml/2006/main">
+  <p:cSld>
+    <p:spTree>
+      <p:nvGrpSpPr>
+        <p:cNvPr id="1" name=""/>
+        <p:cNvGrpSpPr/>
+        <p:nvPr/>
+      </p:nvGrpSpPr>
+      <p:grpSpPr>
+        <a:xfrm>
+          <a:off x="0" y="0"/>
+          <a:ext cx="0" cy="0"/>
+          <a:chOff x="0" y="0"/>
+          <a:chExt cx="0" cy="0"/>
+        </a:xfrm>
+      </p:grpSpPr>
+      <p:sp>
+        <p:nvSpPr>
+          <p:cNvPr id="2" name="Espace réservé de l'image des diapositives 1"/>
+          <p:cNvSpPr>
+            <a:spLocks noGrp="1" noRot="1" noChangeAspect="1"/>
+          </p:cNvSpPr>
+          <p:nvPr>
+            <p:ph type="sldImg"/>
+          </p:nvPr>
+        </p:nvSpPr>
+        <p:spPr/>
+      </p:sp>
+      <p:sp>
+        <p:nvSpPr>
+          <p:cNvPr id="3" name="Espace réservé des notes 2"/>
+          <p:cNvSpPr>
+            <a:spLocks noGrp="1"/>
+          </p:cNvSpPr>
+          <p:nvPr>
+            <p:ph type="body" idx="1"/>
+          </p:nvPr>
+        </p:nvSpPr>
+        <p:spPr/>
+        <p:txBody>
+          <a:bodyPr/>
+          <a:lstStyle/>
+          <a:p>
+            <a:endParaRPr lang="fr-FR" dirty="0"/>
+          </a:p>
+        </p:txBody>
+      </p:sp>
+      <p:sp>
+        <p:nvSpPr>
+          <p:cNvPr id="4" name="Espace réservé du numéro de diapositive 3"/>
+          <p:cNvSpPr>
+            <a:spLocks noGrp="1"/>
+          </p:cNvSpPr>
+          <p:nvPr>
+            <p:ph type="sldNum" sz="quarter" idx="5"/>
+          </p:nvPr>
+        </p:nvSpPr>
+        <p:spPr/>
+        <p:txBody>
+          <a:bodyPr/>
+          <a:lstStyle/>
+          <a:p>
+            <a:fld id="{3137090B-4548-4650-A47F-46F1DB985842}" type="slidenum">
+              <a:rPr lang="fr-FR" smtClean="0"/>
+              <a:t>15</a:t>
+            </a:fld>
+            <a:endParaRPr lang="fr-FR"/>
+          </a:p>
+        </p:txBody>
+      </p:sp>
+    </p:spTree>
+    <p:extLst>
+      <p:ext uri="{BB962C8B-B14F-4D97-AF65-F5344CB8AC3E}">
+        <p14:creationId xmlns:p14="http://schemas.microsoft.com/office/powerpoint/2010/main" val="1453842635"/>
       </p:ext>
     </p:extLst>
   </p:cSld>
@@ -5863,88 +5948,29 @@
       </p:sp>
       <p:sp>
         <p:nvSpPr>
-          <p:cNvPr id="4" name="ZoneTexte 3">
-            <a:extLst>
-              <a:ext uri="{FF2B5EF4-FFF2-40B4-BE49-F238E27FC236}">
-                <a16:creationId xmlns:a16="http://schemas.microsoft.com/office/drawing/2014/main" id="{5B2C0825-ABD4-4F7B-8EA3-9F95BAA7C9AC}"/>
-              </a:ext>
-            </a:extLst>
-          </p:cNvPr>
-          <p:cNvSpPr txBox="1"/>
-          <p:nvPr/>
-        </p:nvSpPr>
-        <p:spPr>
-          <a:xfrm>
-            <a:off x="705853" y="63987"/>
-            <a:ext cx="2757486" cy="369332"/>
-          </a:xfrm>
-          <a:prstGeom prst="rect">
-            <a:avLst/>
-          </a:prstGeom>
-          <a:noFill/>
-        </p:spPr>
-        <p:txBody>
-          <a:bodyPr wrap="none" rtlCol="0">
-            <a:spAutoFit/>
-          </a:bodyPr>
-          <a:lstStyle/>
-          <a:p>
-            <a:r>
-              <a:rPr lang="fr-FR" dirty="0">
-                <a:latin typeface="Roboto Light" panose="02000000000000000000" pitchFamily="2" charset="0"/>
-                <a:ea typeface="Roboto Light" panose="02000000000000000000" pitchFamily="2" charset="0"/>
-              </a:rPr>
-              <a:t>Ecran : Récupération reçu</a:t>
-            </a:r>
-          </a:p>
-        </p:txBody>
-      </p:sp>
-      <p:sp>
-        <p:nvSpPr>
-          <p:cNvPr id="5" name="Titre 1">
-            <a:extLst>
-              <a:ext uri="{FF2B5EF4-FFF2-40B4-BE49-F238E27FC236}">
-                <a16:creationId xmlns:a16="http://schemas.microsoft.com/office/drawing/2014/main" id="{3F8741CE-B246-4A19-9209-A4030ECA25FD}"/>
-              </a:ext>
-            </a:extLst>
-          </p:cNvPr>
-          <p:cNvSpPr txBox="1">
-            <a:spLocks/>
+          <p:cNvPr id="2" name="Titre 1">
+            <a:extLst>
+              <a:ext uri="{FF2B5EF4-FFF2-40B4-BE49-F238E27FC236}">
+                <a16:creationId xmlns:a16="http://schemas.microsoft.com/office/drawing/2014/main" id="{D738593F-B18F-4600-AF47-F18EDBE0844C}"/>
+              </a:ext>
+            </a:extLst>
+          </p:cNvPr>
+          <p:cNvSpPr>
+            <a:spLocks noGrp="1"/>
           </p:cNvSpPr>
-          <p:nvPr/>
-        </p:nvSpPr>
-        <p:spPr>
-          <a:xfrm>
-            <a:off x="1443856" y="706384"/>
-            <a:ext cx="9304283" cy="1325563"/>
-          </a:xfrm>
-          <a:prstGeom prst="rect">
-            <a:avLst/>
-          </a:prstGeom>
-        </p:spPr>
-        <p:txBody>
-          <a:bodyPr vert="horz" lIns="91440" tIns="45720" rIns="91440" bIns="45720" rtlCol="0" anchor="ctr">
-            <a:normAutofit/>
-          </a:bodyPr>
-          <a:lstStyle>
-            <a:lvl1pPr algn="l" defTabSz="914400" rtl="0" eaLnBrk="1" latinLnBrk="0" hangingPunct="1">
-              <a:lnSpc>
-                <a:spcPct val="90000"/>
-              </a:lnSpc>
-              <a:spcBef>
-                <a:spcPct val="0"/>
-              </a:spcBef>
-              <a:buNone/>
-              <a:defRPr sz="4400" kern="1200">
-                <a:solidFill>
-                  <a:schemeClr val="tx1"/>
-                </a:solidFill>
-                <a:latin typeface="+mj-lt"/>
-                <a:ea typeface="+mj-ea"/>
-                <a:cs typeface="+mj-cs"/>
-              </a:defRPr>
-            </a:lvl1pPr>
-          </a:lstStyle>
+          <p:nvPr>
+            <p:ph type="title"/>
+          </p:nvPr>
+        </p:nvSpPr>
+        <p:spPr>
+          <a:xfrm>
+            <a:off x="970547" y="952939"/>
+            <a:ext cx="10515600" cy="1325563"/>
+          </a:xfrm>
+        </p:spPr>
+        <p:txBody>
+          <a:bodyPr/>
+          <a:lstStyle/>
           <a:p>
             <a:pPr algn="ctr"/>
             <a:r>
@@ -5952,17 +5978,68 @@
                 <a:latin typeface="Roboto Light" panose="02000000000000000000" pitchFamily="2" charset="0"/>
                 <a:ea typeface="Roboto Light" panose="02000000000000000000" pitchFamily="2" charset="0"/>
               </a:rPr>
-              <a:t>Veuillez récupérer votre reçu</a:t>
+              <a:t>Veuillez patientez.</a:t>
+            </a:r>
+            <a:br>
+              <a:rPr lang="fr-FR" dirty="0">
+                <a:latin typeface="Roboto Light" panose="02000000000000000000" pitchFamily="2" charset="0"/>
+                <a:ea typeface="Roboto Light" panose="02000000000000000000" pitchFamily="2" charset="0"/>
+              </a:rPr>
+            </a:br>
+            <a:r>
+              <a:rPr lang="fr-FR" dirty="0">
+                <a:latin typeface="Roboto Light" panose="02000000000000000000" pitchFamily="2" charset="0"/>
+                <a:ea typeface="Roboto Light" panose="02000000000000000000" pitchFamily="2" charset="0"/>
+              </a:rPr>
+              <a:t>Impression du reçu en cours.</a:t>
+            </a:r>
+          </a:p>
+        </p:txBody>
+      </p:sp>
+      <p:sp>
+        <p:nvSpPr>
+          <p:cNvPr id="4" name="ZoneTexte 3">
+            <a:extLst>
+              <a:ext uri="{FF2B5EF4-FFF2-40B4-BE49-F238E27FC236}">
+                <a16:creationId xmlns:a16="http://schemas.microsoft.com/office/drawing/2014/main" id="{5B2C0825-ABD4-4F7B-8EA3-9F95BAA7C9AC}"/>
+              </a:ext>
+            </a:extLst>
+          </p:cNvPr>
+          <p:cNvSpPr txBox="1"/>
+          <p:nvPr/>
+        </p:nvSpPr>
+        <p:spPr>
+          <a:xfrm>
+            <a:off x="705853" y="63987"/>
+            <a:ext cx="2550698" cy="369332"/>
+          </a:xfrm>
+          <a:prstGeom prst="rect">
+            <a:avLst/>
+          </a:prstGeom>
+          <a:noFill/>
+        </p:spPr>
+        <p:txBody>
+          <a:bodyPr wrap="none" rtlCol="0">
+            <a:spAutoFit/>
+          </a:bodyPr>
+          <a:lstStyle/>
+          <a:p>
+            <a:r>
+              <a:rPr lang="fr-FR" dirty="0">
+                <a:latin typeface="Roboto Light" panose="02000000000000000000" pitchFamily="2" charset="0"/>
+                <a:ea typeface="Roboto Light" panose="02000000000000000000" pitchFamily="2" charset="0"/>
+              </a:rPr>
+              <a:t>Ecran : Impression reçu</a:t>
             </a:r>
           </a:p>
         </p:txBody>
       </p:sp>
       <p:pic>
         <p:nvPicPr>
-          <p:cNvPr id="10" name="Graphique 9">
-            <a:extLst>
-              <a:ext uri="{FF2B5EF4-FFF2-40B4-BE49-F238E27FC236}">
-                <a16:creationId xmlns:a16="http://schemas.microsoft.com/office/drawing/2014/main" id="{9A6A7926-1DDF-4445-B194-296ED05860CF}"/>
+          <p:cNvPr id="24" name="Graphique 23">
+            <a:extLst>
+              <a:ext uri="{FF2B5EF4-FFF2-40B4-BE49-F238E27FC236}">
+                <a16:creationId xmlns:a16="http://schemas.microsoft.com/office/drawing/2014/main" id="{126D7382-D881-4832-BF60-4183AA7D6918}"/>
               </a:ext>
             </a:extLst>
           </p:cNvPr>
@@ -5972,13 +6049,13 @@
           <p:nvPr/>
         </p:nvPicPr>
         <p:blipFill>
-          <a:blip r:embed="rId2">
+          <a:blip r:embed="rId3">
             <a:extLst>
               <a:ext uri="{28A0092B-C50C-407E-A947-70E740481C1C}">
                 <a14:useLocalDpi xmlns:a14="http://schemas.microsoft.com/office/drawing/2010/main" val="0"/>
               </a:ext>
               <a:ext uri="{96DAC541-7B7A-43D3-8B79-37D633B846F1}">
-                <asvg:svgBlip xmlns:asvg="http://schemas.microsoft.com/office/drawing/2016/SVG/main" r:embed="rId3"/>
+                <asvg:svgBlip xmlns:asvg="http://schemas.microsoft.com/office/drawing/2016/SVG/main" r:embed="rId4"/>
               </a:ext>
             </a:extLst>
           </a:blip>
@@ -5988,8 +6065,8 @@
         </p:blipFill>
         <p:spPr>
           <a:xfrm>
-            <a:off x="4361789" y="2031947"/>
-            <a:ext cx="3468415" cy="3468415"/>
+            <a:off x="4434114" y="2673755"/>
+            <a:ext cx="3323771" cy="3323771"/>
           </a:xfrm>
           <a:prstGeom prst="rect">
             <a:avLst/>
@@ -5999,7 +6076,7 @@
     </p:spTree>
     <p:extLst>
       <p:ext uri="{BB962C8B-B14F-4D97-AF65-F5344CB8AC3E}">
-        <p14:creationId xmlns:p14="http://schemas.microsoft.com/office/powerpoint/2010/main" val="1273032520"/>
+        <p14:creationId xmlns:p14="http://schemas.microsoft.com/office/powerpoint/2010/main" val="3966302431"/>
       </p:ext>
     </p:extLst>
   </p:cSld>
@@ -6096,7 +6173,7 @@
         <p:spPr>
           <a:xfrm>
             <a:off x="705853" y="63987"/>
-            <a:ext cx="2828018" cy="369332"/>
+            <a:ext cx="2757486" cy="369332"/>
           </a:xfrm>
           <a:prstGeom prst="rect">
             <a:avLst/>
@@ -6114,7 +6191,7 @@
                 <a:latin typeface="Roboto Light" panose="02000000000000000000" pitchFamily="2" charset="0"/>
                 <a:ea typeface="Roboto Light" panose="02000000000000000000" pitchFamily="2" charset="0"/>
               </a:rPr>
-              <a:t>Ecran : Récupération carte</a:t>
+              <a:t>Ecran : Récupération reçu</a:t>
             </a:r>
           </a:p>
         </p:txBody>
@@ -6124,7 +6201,7 @@
           <p:cNvPr id="5" name="Titre 1">
             <a:extLst>
               <a:ext uri="{FF2B5EF4-FFF2-40B4-BE49-F238E27FC236}">
-                <a16:creationId xmlns:a16="http://schemas.microsoft.com/office/drawing/2014/main" id="{D6FB2147-9ED0-492E-AA8C-6B7418F15283}"/>
+                <a16:creationId xmlns:a16="http://schemas.microsoft.com/office/drawing/2014/main" id="{3F8741CE-B246-4A19-9209-A4030ECA25FD}"/>
               </a:ext>
             </a:extLst>
           </p:cNvPr>
@@ -6172,17 +6249,17 @@
                 <a:latin typeface="Roboto Light" panose="02000000000000000000" pitchFamily="2" charset="0"/>
                 <a:ea typeface="Roboto Light" panose="02000000000000000000" pitchFamily="2" charset="0"/>
               </a:rPr>
-              <a:t>Veuillez retirer votre carte</a:t>
+              <a:t>Veuillez récupérer votre reçu</a:t>
             </a:r>
           </a:p>
         </p:txBody>
       </p:sp>
       <p:pic>
         <p:nvPicPr>
-          <p:cNvPr id="9" name="Graphique 8">
-            <a:extLst>
-              <a:ext uri="{FF2B5EF4-FFF2-40B4-BE49-F238E27FC236}">
-                <a16:creationId xmlns:a16="http://schemas.microsoft.com/office/drawing/2014/main" id="{2FF17A8E-7523-42D3-8C38-89E9D52BCBF0}"/>
+          <p:cNvPr id="10" name="Graphique 9">
+            <a:extLst>
+              <a:ext uri="{FF2B5EF4-FFF2-40B4-BE49-F238E27FC236}">
+                <a16:creationId xmlns:a16="http://schemas.microsoft.com/office/drawing/2014/main" id="{9A6A7926-1DDF-4445-B194-296ED05860CF}"/>
               </a:ext>
             </a:extLst>
           </p:cNvPr>
@@ -6208,8 +6285,8 @@
         </p:blipFill>
         <p:spPr>
           <a:xfrm>
-            <a:off x="4529928" y="2085416"/>
-            <a:ext cx="3132138" cy="3132138"/>
+            <a:off x="4361789" y="2031947"/>
+            <a:ext cx="3468415" cy="3468415"/>
           </a:xfrm>
           <a:prstGeom prst="rect">
             <a:avLst/>
@@ -6219,7 +6296,7 @@
     </p:spTree>
     <p:extLst>
       <p:ext uri="{BB962C8B-B14F-4D97-AF65-F5344CB8AC3E}">
-        <p14:creationId xmlns:p14="http://schemas.microsoft.com/office/powerpoint/2010/main" val="3275419602"/>
+        <p14:creationId xmlns:p14="http://schemas.microsoft.com/office/powerpoint/2010/main" val="1273032520"/>
       </p:ext>
     </p:extLst>
   </p:cSld>
@@ -6303,6 +6380,226 @@
       </p:sp>
       <p:sp>
         <p:nvSpPr>
+          <p:cNvPr id="4" name="ZoneTexte 3">
+            <a:extLst>
+              <a:ext uri="{FF2B5EF4-FFF2-40B4-BE49-F238E27FC236}">
+                <a16:creationId xmlns:a16="http://schemas.microsoft.com/office/drawing/2014/main" id="{5B2C0825-ABD4-4F7B-8EA3-9F95BAA7C9AC}"/>
+              </a:ext>
+            </a:extLst>
+          </p:cNvPr>
+          <p:cNvSpPr txBox="1"/>
+          <p:nvPr/>
+        </p:nvSpPr>
+        <p:spPr>
+          <a:xfrm>
+            <a:off x="705853" y="63987"/>
+            <a:ext cx="2828018" cy="369332"/>
+          </a:xfrm>
+          <a:prstGeom prst="rect">
+            <a:avLst/>
+          </a:prstGeom>
+          <a:noFill/>
+        </p:spPr>
+        <p:txBody>
+          <a:bodyPr wrap="none" rtlCol="0">
+            <a:spAutoFit/>
+          </a:bodyPr>
+          <a:lstStyle/>
+          <a:p>
+            <a:r>
+              <a:rPr lang="fr-FR" dirty="0">
+                <a:latin typeface="Roboto Light" panose="02000000000000000000" pitchFamily="2" charset="0"/>
+                <a:ea typeface="Roboto Light" panose="02000000000000000000" pitchFamily="2" charset="0"/>
+              </a:rPr>
+              <a:t>Ecran : Récupération carte</a:t>
+            </a:r>
+          </a:p>
+        </p:txBody>
+      </p:sp>
+      <p:sp>
+        <p:nvSpPr>
+          <p:cNvPr id="5" name="Titre 1">
+            <a:extLst>
+              <a:ext uri="{FF2B5EF4-FFF2-40B4-BE49-F238E27FC236}">
+                <a16:creationId xmlns:a16="http://schemas.microsoft.com/office/drawing/2014/main" id="{D6FB2147-9ED0-492E-AA8C-6B7418F15283}"/>
+              </a:ext>
+            </a:extLst>
+          </p:cNvPr>
+          <p:cNvSpPr txBox="1">
+            <a:spLocks/>
+          </p:cNvSpPr>
+          <p:nvPr/>
+        </p:nvSpPr>
+        <p:spPr>
+          <a:xfrm>
+            <a:off x="1443856" y="706384"/>
+            <a:ext cx="9304283" cy="1325563"/>
+          </a:xfrm>
+          <a:prstGeom prst="rect">
+            <a:avLst/>
+          </a:prstGeom>
+        </p:spPr>
+        <p:txBody>
+          <a:bodyPr vert="horz" lIns="91440" tIns="45720" rIns="91440" bIns="45720" rtlCol="0" anchor="ctr">
+            <a:normAutofit/>
+          </a:bodyPr>
+          <a:lstStyle>
+            <a:lvl1pPr algn="l" defTabSz="914400" rtl="0" eaLnBrk="1" latinLnBrk="0" hangingPunct="1">
+              <a:lnSpc>
+                <a:spcPct val="90000"/>
+              </a:lnSpc>
+              <a:spcBef>
+                <a:spcPct val="0"/>
+              </a:spcBef>
+              <a:buNone/>
+              <a:defRPr sz="4400" kern="1200">
+                <a:solidFill>
+                  <a:schemeClr val="tx1"/>
+                </a:solidFill>
+                <a:latin typeface="+mj-lt"/>
+                <a:ea typeface="+mj-ea"/>
+                <a:cs typeface="+mj-cs"/>
+              </a:defRPr>
+            </a:lvl1pPr>
+          </a:lstStyle>
+          <a:p>
+            <a:pPr algn="ctr"/>
+            <a:r>
+              <a:rPr lang="fr-FR" dirty="0">
+                <a:latin typeface="Roboto Light" panose="02000000000000000000" pitchFamily="2" charset="0"/>
+                <a:ea typeface="Roboto Light" panose="02000000000000000000" pitchFamily="2" charset="0"/>
+              </a:rPr>
+              <a:t>Veuillez retirer votre carte</a:t>
+            </a:r>
+          </a:p>
+        </p:txBody>
+      </p:sp>
+      <p:pic>
+        <p:nvPicPr>
+          <p:cNvPr id="9" name="Graphique 8">
+            <a:extLst>
+              <a:ext uri="{FF2B5EF4-FFF2-40B4-BE49-F238E27FC236}">
+                <a16:creationId xmlns:a16="http://schemas.microsoft.com/office/drawing/2014/main" id="{2FF17A8E-7523-42D3-8C38-89E9D52BCBF0}"/>
+              </a:ext>
+            </a:extLst>
+          </p:cNvPr>
+          <p:cNvPicPr>
+            <a:picLocks noChangeAspect="1"/>
+          </p:cNvPicPr>
+          <p:nvPr/>
+        </p:nvPicPr>
+        <p:blipFill>
+          <a:blip r:embed="rId2">
+            <a:extLst>
+              <a:ext uri="{28A0092B-C50C-407E-A947-70E740481C1C}">
+                <a14:useLocalDpi xmlns:a14="http://schemas.microsoft.com/office/drawing/2010/main" val="0"/>
+              </a:ext>
+              <a:ext uri="{96DAC541-7B7A-43D3-8B79-37D633B846F1}">
+                <asvg:svgBlip xmlns:asvg="http://schemas.microsoft.com/office/drawing/2016/SVG/main" r:embed="rId3"/>
+              </a:ext>
+            </a:extLst>
+          </a:blip>
+          <a:stretch>
+            <a:fillRect/>
+          </a:stretch>
+        </p:blipFill>
+        <p:spPr>
+          <a:xfrm>
+            <a:off x="4529928" y="2085416"/>
+            <a:ext cx="3132138" cy="3132138"/>
+          </a:xfrm>
+          <a:prstGeom prst="rect">
+            <a:avLst/>
+          </a:prstGeom>
+        </p:spPr>
+      </p:pic>
+    </p:spTree>
+    <p:extLst>
+      <p:ext uri="{BB962C8B-B14F-4D97-AF65-F5344CB8AC3E}">
+        <p14:creationId xmlns:p14="http://schemas.microsoft.com/office/powerpoint/2010/main" val="3275419602"/>
+      </p:ext>
+    </p:extLst>
+  </p:cSld>
+  <p:clrMapOvr>
+    <a:masterClrMapping/>
+  </p:clrMapOvr>
+</p:sld>
+</file>
+
+<file path=ppt/slides/slide18.xml><?xml version="1.0" encoding="utf-8"?>
+<p:sld xmlns:a="http://schemas.openxmlformats.org/drawingml/2006/main" xmlns:r="http://schemas.openxmlformats.org/officeDocument/2006/relationships" xmlns:p="http://schemas.openxmlformats.org/presentationml/2006/main">
+  <p:cSld>
+    <p:spTree>
+      <p:nvGrpSpPr>
+        <p:cNvPr id="1" name=""/>
+        <p:cNvGrpSpPr/>
+        <p:nvPr/>
+      </p:nvGrpSpPr>
+      <p:grpSpPr>
+        <a:xfrm>
+          <a:off x="0" y="0"/>
+          <a:ext cx="0" cy="0"/>
+          <a:chOff x="0" y="0"/>
+          <a:chExt cx="0" cy="0"/>
+        </a:xfrm>
+      </p:grpSpPr>
+      <p:sp>
+        <p:nvSpPr>
+          <p:cNvPr id="3" name="Rectangle 2">
+            <a:extLst>
+              <a:ext uri="{FF2B5EF4-FFF2-40B4-BE49-F238E27FC236}">
+                <a16:creationId xmlns:a16="http://schemas.microsoft.com/office/drawing/2014/main" id="{2E8E3367-571F-486C-80AB-043BF71E1C3E}"/>
+              </a:ext>
+            </a:extLst>
+          </p:cNvPr>
+          <p:cNvSpPr/>
+          <p:nvPr/>
+        </p:nvSpPr>
+        <p:spPr>
+          <a:xfrm>
+            <a:off x="705853" y="465221"/>
+            <a:ext cx="10780295" cy="5927558"/>
+          </a:xfrm>
+          <a:prstGeom prst="rect">
+            <a:avLst/>
+          </a:prstGeom>
+          <a:noFill/>
+          <a:ln w="57150">
+            <a:solidFill>
+              <a:srgbClr val="FFC000"/>
+            </a:solidFill>
+          </a:ln>
+        </p:spPr>
+        <p:style>
+          <a:lnRef idx="2">
+            <a:schemeClr val="accent1">
+              <a:shade val="50000"/>
+            </a:schemeClr>
+          </a:lnRef>
+          <a:fillRef idx="1">
+            <a:schemeClr val="accent1"/>
+          </a:fillRef>
+          <a:effectRef idx="0">
+            <a:schemeClr val="accent1"/>
+          </a:effectRef>
+          <a:fontRef idx="minor">
+            <a:schemeClr val="lt1"/>
+          </a:fontRef>
+        </p:style>
+        <p:txBody>
+          <a:bodyPr rtlCol="0" anchor="ctr"/>
+          <a:lstStyle/>
+          <a:p>
+            <a:pPr algn="ctr"/>
+            <a:endParaRPr lang="fr-FR">
+              <a:latin typeface="Roboto Light" panose="02000000000000000000" pitchFamily="2" charset="0"/>
+              <a:ea typeface="Roboto Light" panose="02000000000000000000" pitchFamily="2" charset="0"/>
+            </a:endParaRPr>
+          </a:p>
+        </p:txBody>
+      </p:sp>
+      <p:sp>
+        <p:nvSpPr>
           <p:cNvPr id="2" name="Titre 1">
             <a:extLst>
               <a:ext uri="{FF2B5EF4-FFF2-40B4-BE49-F238E27FC236}">
@@ -6443,7 +6740,7 @@
 </p:sld>
 </file>
 
-<file path=ppt/slides/slide18.xml><?xml version="1.0" encoding="utf-8"?>
+<file path=ppt/slides/slide19.xml><?xml version="1.0" encoding="utf-8"?>
 <p:sld xmlns:a="http://schemas.openxmlformats.org/drawingml/2006/main" xmlns:r="http://schemas.openxmlformats.org/officeDocument/2006/relationships" xmlns:p="http://schemas.openxmlformats.org/presentationml/2006/main">
   <p:cSld>
     <p:bg>
@@ -6470,10 +6767,10 @@
       </p:grpSpPr>
       <p:sp>
         <p:nvSpPr>
-          <p:cNvPr id="15" name="Down Arrow 7">
-            <a:extLst>
-              <a:ext uri="{FF2B5EF4-FFF2-40B4-BE49-F238E27FC236}">
-                <a16:creationId xmlns:a16="http://schemas.microsoft.com/office/drawing/2014/main" id="{D4771268-CB57-404A-9271-370EB28F6090}"/>
+          <p:cNvPr id="20" name="Rectangle 19">
+            <a:extLst>
+              <a:ext uri="{FF2B5EF4-FFF2-40B4-BE49-F238E27FC236}">
+                <a16:creationId xmlns:a16="http://schemas.microsoft.com/office/drawing/2014/main" id="{7CA0DAA6-33B8-4A25-810D-2F4D816FB40E}"/>
               </a:ext>
               <a:ext uri="{C183D7F6-B498-43B3-948B-1728B52AA6E4}">
                 <adec:decorative xmlns:adec="http://schemas.microsoft.com/office/drawing/2017/decorative" val="1"/>
@@ -6491,21 +6788,21 @@
             </p:extLst>
           </p:nvPr>
         </p:nvSpPr>
-        <p:spPr>
-          <a:xfrm rot="16200000">
-            <a:off x="800100" y="1491343"/>
-            <a:ext cx="3333749" cy="3499103"/>
-          </a:xfrm>
-          <a:prstGeom prst="downArrow">
-            <a:avLst>
-              <a:gd name="adj1" fmla="val 100000"/>
-              <a:gd name="adj2" fmla="val 15788"/>
-            </a:avLst>
+        <p:spPr bwMode="white">
+          <a:xfrm>
+            <a:off x="0" y="0"/>
+            <a:ext cx="4654297" cy="6858000"/>
+          </a:xfrm>
+          <a:prstGeom prst="rect">
+            <a:avLst/>
           </a:prstGeom>
           <a:solidFill>
-            <a:srgbClr val="404040"/>
+            <a:schemeClr val="tx1">
+              <a:lumMod val="85000"/>
+              <a:lumOff val="15000"/>
+            </a:schemeClr>
           </a:solidFill>
-          <a:ln w="53975">
+          <a:ln>
             <a:noFill/>
           </a:ln>
         </p:spPr>
@@ -6552,25 +6849,25 @@
         </p:nvSpPr>
         <p:spPr>
           <a:xfrm>
-            <a:off x="1028700" y="1967266"/>
-            <a:ext cx="2628900" cy="2547257"/>
+            <a:off x="651307" y="640081"/>
+            <a:ext cx="3377183" cy="3681976"/>
           </a:xfrm>
           <a:noFill/>
         </p:spPr>
         <p:txBody>
-          <a:bodyPr anchor="ctr">
+          <a:bodyPr vert="horz" lIns="91440" tIns="45720" rIns="91440" bIns="45720" rtlCol="0" anchor="b">
             <a:normAutofit/>
           </a:bodyPr>
           <a:lstStyle/>
           <a:p>
-            <a:pPr algn="ctr"/>
             <a:r>
-              <a:rPr lang="fr-FR" sz="3600">
+              <a:rPr lang="en-US" kern="1200">
                 <a:solidFill>
-                  <a:srgbClr val="FFFFFF"/>
+                  <a:schemeClr val="bg1"/>
                 </a:solidFill>
-                <a:latin typeface="Roboto Light" panose="02000000000000000000" pitchFamily="2" charset="0"/>
-                <a:ea typeface="Roboto Light" panose="02000000000000000000" pitchFamily="2" charset="0"/>
+                <a:latin typeface="+mj-lt"/>
+                <a:ea typeface="+mj-ea"/>
+                <a:cs typeface="+mj-cs"/>
               </a:rPr>
               <a:t>Diagramme de navigabilité</a:t>
             </a:r>
@@ -6579,10 +6876,10 @@
       </p:sp>
       <p:pic>
         <p:nvPicPr>
-          <p:cNvPr id="14" name="Image 13">
-            <a:extLst>
-              <a:ext uri="{FF2B5EF4-FFF2-40B4-BE49-F238E27FC236}">
-                <a16:creationId xmlns:a16="http://schemas.microsoft.com/office/drawing/2014/main" id="{FE21794D-2E4C-49A3-A772-8A5868AEA779}"/>
+          <p:cNvPr id="6" name="Image 5">
+            <a:extLst>
+              <a:ext uri="{FF2B5EF4-FFF2-40B4-BE49-F238E27FC236}">
+                <a16:creationId xmlns:a16="http://schemas.microsoft.com/office/drawing/2014/main" id="{D41C6BD1-A52E-4456-840A-B7C85275F35D}"/>
               </a:ext>
             </a:extLst>
           </p:cNvPr>
@@ -6605,8 +6902,8 @@
         </p:blipFill>
         <p:spPr>
           <a:xfrm>
-            <a:off x="4673888" y="0"/>
-            <a:ext cx="7258568" cy="6858000"/>
+            <a:off x="4679797" y="0"/>
+            <a:ext cx="7486477" cy="6858000"/>
           </a:xfrm>
           <a:prstGeom prst="rect">
             <a:avLst/>

</xml_diff>

<commit_message>
UP _ exo GAB update ecran code incorrect
</commit_message>
<xml_diff>
--- a/FOAD_Unified_Process/GAB/maquettage et diagramme de navigabilité_GAB_retirer de l'argent dont s'identifier.pptx
+++ b/FOAD_Unified_Process/GAB/maquettage et diagramme de navigabilité_GAB_retirer de l'argent dont s'identifier.pptx
@@ -12,7 +12,7 @@
     <p:sldId id="258" r:id="rId3"/>
     <p:sldId id="279" r:id="rId4"/>
     <p:sldId id="259" r:id="rId5"/>
-    <p:sldId id="262" r:id="rId6"/>
+    <p:sldId id="281" r:id="rId6"/>
     <p:sldId id="263" r:id="rId7"/>
     <p:sldId id="260" r:id="rId8"/>
     <p:sldId id="267" r:id="rId9"/>
@@ -215,7 +215,7 @@
           <a:p>
             <a:fld id="{F96AEA39-73FA-47F0-852A-B7EF8546D397}" type="datetimeFigureOut">
               <a:rPr lang="fr-FR" smtClean="0"/>
-              <a:t>22/02/2021</a:t>
+              <a:t>23/02/2021</a:t>
             </a:fld>
             <a:endParaRPr lang="fr-FR"/>
           </a:p>
@@ -1217,7 +1217,7 @@
           <a:p>
             <a:fld id="{B0CDD8A6-34CA-4E2D-8EA8-2CC00E15D543}" type="datetimeFigureOut">
               <a:rPr lang="fr-FR" smtClean="0"/>
-              <a:t>22/02/2021</a:t>
+              <a:t>23/02/2021</a:t>
             </a:fld>
             <a:endParaRPr lang="fr-FR"/>
           </a:p>
@@ -1415,7 +1415,7 @@
           <a:p>
             <a:fld id="{B0CDD8A6-34CA-4E2D-8EA8-2CC00E15D543}" type="datetimeFigureOut">
               <a:rPr lang="fr-FR" smtClean="0"/>
-              <a:t>22/02/2021</a:t>
+              <a:t>23/02/2021</a:t>
             </a:fld>
             <a:endParaRPr lang="fr-FR"/>
           </a:p>
@@ -1623,7 +1623,7 @@
           <a:p>
             <a:fld id="{B0CDD8A6-34CA-4E2D-8EA8-2CC00E15D543}" type="datetimeFigureOut">
               <a:rPr lang="fr-FR" smtClean="0"/>
-              <a:t>22/02/2021</a:t>
+              <a:t>23/02/2021</a:t>
             </a:fld>
             <a:endParaRPr lang="fr-FR"/>
           </a:p>
@@ -1821,7 +1821,7 @@
           <a:p>
             <a:fld id="{B0CDD8A6-34CA-4E2D-8EA8-2CC00E15D543}" type="datetimeFigureOut">
               <a:rPr lang="fr-FR" smtClean="0"/>
-              <a:t>22/02/2021</a:t>
+              <a:t>23/02/2021</a:t>
             </a:fld>
             <a:endParaRPr lang="fr-FR"/>
           </a:p>
@@ -2096,7 +2096,7 @@
           <a:p>
             <a:fld id="{B0CDD8A6-34CA-4E2D-8EA8-2CC00E15D543}" type="datetimeFigureOut">
               <a:rPr lang="fr-FR" smtClean="0"/>
-              <a:t>22/02/2021</a:t>
+              <a:t>23/02/2021</a:t>
             </a:fld>
             <a:endParaRPr lang="fr-FR"/>
           </a:p>
@@ -2361,7 +2361,7 @@
           <a:p>
             <a:fld id="{B0CDD8A6-34CA-4E2D-8EA8-2CC00E15D543}" type="datetimeFigureOut">
               <a:rPr lang="fr-FR" smtClean="0"/>
-              <a:t>22/02/2021</a:t>
+              <a:t>23/02/2021</a:t>
             </a:fld>
             <a:endParaRPr lang="fr-FR"/>
           </a:p>
@@ -2773,7 +2773,7 @@
           <a:p>
             <a:fld id="{B0CDD8A6-34CA-4E2D-8EA8-2CC00E15D543}" type="datetimeFigureOut">
               <a:rPr lang="fr-FR" smtClean="0"/>
-              <a:t>22/02/2021</a:t>
+              <a:t>23/02/2021</a:t>
             </a:fld>
             <a:endParaRPr lang="fr-FR"/>
           </a:p>
@@ -2914,7 +2914,7 @@
           <a:p>
             <a:fld id="{B0CDD8A6-34CA-4E2D-8EA8-2CC00E15D543}" type="datetimeFigureOut">
               <a:rPr lang="fr-FR" smtClean="0"/>
-              <a:t>22/02/2021</a:t>
+              <a:t>23/02/2021</a:t>
             </a:fld>
             <a:endParaRPr lang="fr-FR"/>
           </a:p>
@@ -3027,7 +3027,7 @@
           <a:p>
             <a:fld id="{B0CDD8A6-34CA-4E2D-8EA8-2CC00E15D543}" type="datetimeFigureOut">
               <a:rPr lang="fr-FR" smtClean="0"/>
-              <a:t>22/02/2021</a:t>
+              <a:t>23/02/2021</a:t>
             </a:fld>
             <a:endParaRPr lang="fr-FR"/>
           </a:p>
@@ -3338,7 +3338,7 @@
           <a:p>
             <a:fld id="{B0CDD8A6-34CA-4E2D-8EA8-2CC00E15D543}" type="datetimeFigureOut">
               <a:rPr lang="fr-FR" smtClean="0"/>
-              <a:t>22/02/2021</a:t>
+              <a:t>23/02/2021</a:t>
             </a:fld>
             <a:endParaRPr lang="fr-FR"/>
           </a:p>
@@ -3626,7 +3626,7 @@
           <a:p>
             <a:fld id="{B0CDD8A6-34CA-4E2D-8EA8-2CC00E15D543}" type="datetimeFigureOut">
               <a:rPr lang="fr-FR" smtClean="0"/>
-              <a:t>22/02/2021</a:t>
+              <a:t>23/02/2021</a:t>
             </a:fld>
             <a:endParaRPr lang="fr-FR"/>
           </a:p>
@@ -3867,7 +3867,7 @@
           <a:p>
             <a:fld id="{B0CDD8A6-34CA-4E2D-8EA8-2CC00E15D543}" type="datetimeFigureOut">
               <a:rPr lang="fr-FR" smtClean="0"/>
-              <a:t>22/02/2021</a:t>
+              <a:t>23/02/2021</a:t>
             </a:fld>
             <a:endParaRPr lang="fr-FR"/>
           </a:p>
@@ -4675,12 +4675,28 @@
               </a:rPr>
             </a:br>
             <a:r>
-              <a:rPr lang="fr-FR" sz="3600" dirty="0">
+              <a:rPr lang="fr-FR" sz="3200" i="1" dirty="0">
+                <a:solidFill>
+                  <a:schemeClr val="tx1">
+                    <a:lumMod val="50000"/>
+                    <a:lumOff val="50000"/>
+                  </a:schemeClr>
+                </a:solidFill>
                 <a:latin typeface="Roboto Light" panose="02000000000000000000" pitchFamily="2" charset="0"/>
                 <a:ea typeface="Roboto Light" panose="02000000000000000000" pitchFamily="2" charset="0"/>
               </a:rPr>
               <a:t>** message personnalisé : raison **</a:t>
             </a:r>
+            <a:endParaRPr lang="fr-FR" sz="4000" i="1" dirty="0">
+              <a:solidFill>
+                <a:schemeClr val="tx1">
+                  <a:lumMod val="50000"/>
+                  <a:lumOff val="50000"/>
+                </a:schemeClr>
+              </a:solidFill>
+              <a:latin typeface="Roboto Light" panose="02000000000000000000" pitchFamily="2" charset="0"/>
+              <a:ea typeface="Roboto Light" panose="02000000000000000000" pitchFamily="2" charset="0"/>
+            </a:endParaRPr>
           </a:p>
         </p:txBody>
       </p:sp>
@@ -5314,12 +5330,28 @@
               </a:rPr>
             </a:br>
             <a:r>
-              <a:rPr lang="fr-FR" sz="3600" dirty="0">
+              <a:rPr lang="fr-FR" sz="3200" i="1" dirty="0">
+                <a:solidFill>
+                  <a:schemeClr val="tx1">
+                    <a:lumMod val="50000"/>
+                    <a:lumOff val="50000"/>
+                  </a:schemeClr>
+                </a:solidFill>
                 <a:latin typeface="Roboto Light" panose="02000000000000000000" pitchFamily="2" charset="0"/>
                 <a:ea typeface="Roboto Light" panose="02000000000000000000" pitchFamily="2" charset="0"/>
               </a:rPr>
               <a:t>** message personnalisé : raison **</a:t>
             </a:r>
+            <a:endParaRPr lang="fr-FR" sz="4000" i="1" dirty="0">
+              <a:solidFill>
+                <a:schemeClr val="tx1">
+                  <a:lumMod val="50000"/>
+                  <a:lumOff val="50000"/>
+                </a:schemeClr>
+              </a:solidFill>
+              <a:latin typeface="Roboto Light" panose="02000000000000000000" pitchFamily="2" charset="0"/>
+              <a:ea typeface="Roboto Light" panose="02000000000000000000" pitchFamily="2" charset="0"/>
+            </a:endParaRPr>
           </a:p>
         </p:txBody>
       </p:sp>
@@ -6876,10 +6908,10 @@
       </p:sp>
       <p:pic>
         <p:nvPicPr>
-          <p:cNvPr id="6" name="Image 5">
-            <a:extLst>
-              <a:ext uri="{FF2B5EF4-FFF2-40B4-BE49-F238E27FC236}">
-                <a16:creationId xmlns:a16="http://schemas.microsoft.com/office/drawing/2014/main" id="{D41C6BD1-A52E-4456-840A-B7C85275F35D}"/>
+          <p:cNvPr id="4" name="Image 3">
+            <a:extLst>
+              <a:ext uri="{FF2B5EF4-FFF2-40B4-BE49-F238E27FC236}">
+                <a16:creationId xmlns:a16="http://schemas.microsoft.com/office/drawing/2014/main" id="{7111A0D6-28A1-40DD-A522-9C1ACE601C41}"/>
               </a:ext>
             </a:extLst>
           </p:cNvPr>
@@ -6902,7 +6934,7 @@
         </p:blipFill>
         <p:spPr>
           <a:xfrm>
-            <a:off x="4679797" y="0"/>
+            <a:off x="4669287" y="0"/>
             <a:ext cx="7486477" cy="6858000"/>
           </a:xfrm>
           <a:prstGeom prst="rect">
@@ -9485,57 +9517,1758 @@
           <a:p>
             <a:pPr algn="ctr"/>
             <a:endParaRPr lang="fr-FR">
-              <a:latin typeface="Roboto Light" panose="02000000000000000000" pitchFamily="2" charset="0"/>
-              <a:ea typeface="Roboto Light" panose="02000000000000000000" pitchFamily="2" charset="0"/>
+              <a:latin typeface="+mj-lt"/>
             </a:endParaRPr>
           </a:p>
         </p:txBody>
       </p:sp>
-      <p:sp>
-        <p:nvSpPr>
-          <p:cNvPr id="2" name="Titre 1">
-            <a:extLst>
-              <a:ext uri="{FF2B5EF4-FFF2-40B4-BE49-F238E27FC236}">
-                <a16:creationId xmlns:a16="http://schemas.microsoft.com/office/drawing/2014/main" id="{D738593F-B18F-4600-AF47-F18EDBE0844C}"/>
-              </a:ext>
-            </a:extLst>
-          </p:cNvPr>
-          <p:cNvSpPr>
-            <a:spLocks noGrp="1"/>
-          </p:cNvSpPr>
-          <p:nvPr>
-            <p:ph type="title"/>
-          </p:nvPr>
-        </p:nvSpPr>
-        <p:spPr>
+      <p:grpSp>
+        <p:nvGrpSpPr>
+          <p:cNvPr id="55" name="Groupe 54">
+            <a:extLst>
+              <a:ext uri="{FF2B5EF4-FFF2-40B4-BE49-F238E27FC236}">
+                <a16:creationId xmlns:a16="http://schemas.microsoft.com/office/drawing/2014/main" id="{5269154E-129A-41A8-A6D9-07AB2800CCC7}"/>
+              </a:ext>
+            </a:extLst>
+          </p:cNvPr>
+          <p:cNvGrpSpPr/>
+          <p:nvPr/>
+        </p:nvGrpSpPr>
+        <p:grpSpPr>
           <a:xfrm>
-            <a:off x="838200" y="2205667"/>
-            <a:ext cx="10515600" cy="1199670"/>
+            <a:off x="7721581" y="2546591"/>
+            <a:ext cx="3430595" cy="2443852"/>
+            <a:chOff x="4311280" y="2293746"/>
+            <a:chExt cx="4085960" cy="2910714"/>
           </a:xfrm>
-        </p:spPr>
-        <p:txBody>
-          <a:bodyPr>
-            <a:normAutofit/>
-          </a:bodyPr>
-          <a:lstStyle/>
-          <a:p>
-            <a:pPr algn="ctr"/>
-            <a:r>
-              <a:rPr lang="fr-FR" dirty="0">
-                <a:latin typeface="Roboto Light" panose="02000000000000000000" pitchFamily="2" charset="0"/>
-                <a:ea typeface="Roboto Light" panose="02000000000000000000" pitchFamily="2" charset="0"/>
-              </a:rPr>
-              <a:t>Code confidentiel incorrect.</a:t>
-            </a:r>
-          </a:p>
-        </p:txBody>
-      </p:sp>
-      <p:sp>
-        <p:nvSpPr>
-          <p:cNvPr id="4" name="ZoneTexte 3">
-            <a:extLst>
-              <a:ext uri="{FF2B5EF4-FFF2-40B4-BE49-F238E27FC236}">
-                <a16:creationId xmlns:a16="http://schemas.microsoft.com/office/drawing/2014/main" id="{5B2C0825-ABD4-4F7B-8EA3-9F95BAA7C9AC}"/>
+        </p:grpSpPr>
+        <p:sp>
+          <p:nvSpPr>
+            <p:cNvPr id="9" name="Forme libre : forme 8">
+              <a:extLst>
+                <a:ext uri="{FF2B5EF4-FFF2-40B4-BE49-F238E27FC236}">
+                  <a16:creationId xmlns:a16="http://schemas.microsoft.com/office/drawing/2014/main" id="{1677A3E3-7749-4785-9A59-05A7D7584C53}"/>
+                </a:ext>
+              </a:extLst>
+            </p:cNvPr>
+            <p:cNvSpPr/>
+            <p:nvPr/>
+          </p:nvSpPr>
+          <p:spPr>
+            <a:xfrm>
+              <a:off x="4311280" y="2293746"/>
+              <a:ext cx="4085960" cy="2910714"/>
+            </a:xfrm>
+            <a:custGeom>
+              <a:avLst/>
+              <a:gdLst>
+                <a:gd name="connsiteX0" fmla="*/ 0 w 2354323"/>
+                <a:gd name="connsiteY0" fmla="*/ 2690640 h 2690640"/>
+                <a:gd name="connsiteX1" fmla="*/ 2354323 w 2354323"/>
+                <a:gd name="connsiteY1" fmla="*/ 2690640 h 2690640"/>
+                <a:gd name="connsiteX2" fmla="*/ 2354323 w 2354323"/>
+                <a:gd name="connsiteY2" fmla="*/ -1 h 2690640"/>
+                <a:gd name="connsiteX3" fmla="*/ 0 w 2354323"/>
+                <a:gd name="connsiteY3" fmla="*/ -1 h 2690640"/>
+              </a:gdLst>
+              <a:ahLst/>
+              <a:cxnLst>
+                <a:cxn ang="0">
+                  <a:pos x="connsiteX0" y="connsiteY0"/>
+                </a:cxn>
+                <a:cxn ang="0">
+                  <a:pos x="connsiteX1" y="connsiteY1"/>
+                </a:cxn>
+                <a:cxn ang="0">
+                  <a:pos x="connsiteX2" y="connsiteY2"/>
+                </a:cxn>
+                <a:cxn ang="0">
+                  <a:pos x="connsiteX3" y="connsiteY3"/>
+                </a:cxn>
+              </a:cxnLst>
+              <a:rect l="l" t="t" r="r" b="b"/>
+              <a:pathLst>
+                <a:path w="2354323" h="2690640">
+                  <a:moveTo>
+                    <a:pt x="0" y="2690640"/>
+                  </a:moveTo>
+                  <a:lnTo>
+                    <a:pt x="2354323" y="2690640"/>
+                  </a:lnTo>
+                  <a:lnTo>
+                    <a:pt x="2354323" y="-1"/>
+                  </a:lnTo>
+                  <a:lnTo>
+                    <a:pt x="0" y="-1"/>
+                  </a:lnTo>
+                  <a:close/>
+                </a:path>
+              </a:pathLst>
+            </a:custGeom>
+            <a:solidFill>
+              <a:schemeClr val="bg1">
+                <a:lumMod val="50000"/>
+              </a:schemeClr>
+            </a:solidFill>
+            <a:ln w="9525" cap="flat">
+              <a:noFill/>
+              <a:prstDash val="solid"/>
+              <a:miter/>
+            </a:ln>
+          </p:spPr>
+          <p:txBody>
+            <a:bodyPr rtlCol="0" anchor="ctr"/>
+            <a:lstStyle/>
+            <a:p>
+              <a:endParaRPr lang="fr-FR">
+                <a:latin typeface="+mj-lt"/>
+              </a:endParaRPr>
+            </a:p>
+          </p:txBody>
+        </p:sp>
+        <p:sp>
+          <p:nvSpPr>
+            <p:cNvPr id="16" name="Forme libre : forme 15">
+              <a:extLst>
+                <a:ext uri="{FF2B5EF4-FFF2-40B4-BE49-F238E27FC236}">
+                  <a16:creationId xmlns:a16="http://schemas.microsoft.com/office/drawing/2014/main" id="{3F7E4DBF-2362-4437-923C-3B5098AEE64C}"/>
+                </a:ext>
+              </a:extLst>
+            </p:cNvPr>
+            <p:cNvSpPr/>
+            <p:nvPr/>
+          </p:nvSpPr>
+          <p:spPr>
+            <a:xfrm>
+              <a:off x="4582060" y="2668049"/>
+              <a:ext cx="707231" cy="477006"/>
+            </a:xfrm>
+            <a:custGeom>
+              <a:avLst/>
+              <a:gdLst>
+                <a:gd name="connsiteX0" fmla="*/ 168173 w 252260"/>
+                <a:gd name="connsiteY0" fmla="*/ 168172 h 168173"/>
+                <a:gd name="connsiteX1" fmla="*/ 84087 w 252260"/>
+                <a:gd name="connsiteY1" fmla="*/ 168172 h 168173"/>
+                <a:gd name="connsiteX2" fmla="*/ 0 w 252260"/>
+                <a:gd name="connsiteY2" fmla="*/ 84086 h 168173"/>
+                <a:gd name="connsiteX3" fmla="*/ 84087 w 252260"/>
+                <a:gd name="connsiteY3" fmla="*/ -1 h 168173"/>
+                <a:gd name="connsiteX4" fmla="*/ 168173 w 252260"/>
+                <a:gd name="connsiteY4" fmla="*/ -1 h 168173"/>
+                <a:gd name="connsiteX5" fmla="*/ 252260 w 252260"/>
+                <a:gd name="connsiteY5" fmla="*/ 84086 h 168173"/>
+                <a:gd name="connsiteX6" fmla="*/ 168173 w 252260"/>
+                <a:gd name="connsiteY6" fmla="*/ 168172 h 168173"/>
+              </a:gdLst>
+              <a:ahLst/>
+              <a:cxnLst>
+                <a:cxn ang="0">
+                  <a:pos x="connsiteX0" y="connsiteY0"/>
+                </a:cxn>
+                <a:cxn ang="0">
+                  <a:pos x="connsiteX1" y="connsiteY1"/>
+                </a:cxn>
+                <a:cxn ang="0">
+                  <a:pos x="connsiteX2" y="connsiteY2"/>
+                </a:cxn>
+                <a:cxn ang="0">
+                  <a:pos x="connsiteX3" y="connsiteY3"/>
+                </a:cxn>
+                <a:cxn ang="0">
+                  <a:pos x="connsiteX4" y="connsiteY4"/>
+                </a:cxn>
+                <a:cxn ang="0">
+                  <a:pos x="connsiteX5" y="connsiteY5"/>
+                </a:cxn>
+                <a:cxn ang="0">
+                  <a:pos x="connsiteX6" y="connsiteY6"/>
+                </a:cxn>
+              </a:cxnLst>
+              <a:rect l="l" t="t" r="r" b="b"/>
+              <a:pathLst>
+                <a:path w="252260" h="168173">
+                  <a:moveTo>
+                    <a:pt x="168173" y="168172"/>
+                  </a:moveTo>
+                  <a:lnTo>
+                    <a:pt x="84087" y="168172"/>
+                  </a:lnTo>
+                  <a:cubicBezTo>
+                    <a:pt x="37671" y="168172"/>
+                    <a:pt x="0" y="130587"/>
+                    <a:pt x="0" y="84086"/>
+                  </a:cubicBezTo>
+                  <a:cubicBezTo>
+                    <a:pt x="0" y="37585"/>
+                    <a:pt x="37671" y="-1"/>
+                    <a:pt x="84087" y="-1"/>
+                  </a:cubicBezTo>
+                  <a:lnTo>
+                    <a:pt x="168173" y="-1"/>
+                  </a:lnTo>
+                  <a:cubicBezTo>
+                    <a:pt x="214589" y="-1"/>
+                    <a:pt x="252260" y="37585"/>
+                    <a:pt x="252260" y="84086"/>
+                  </a:cubicBezTo>
+                  <a:cubicBezTo>
+                    <a:pt x="252260" y="130587"/>
+                    <a:pt x="214589" y="168172"/>
+                    <a:pt x="168173" y="168172"/>
+                  </a:cubicBezTo>
+                </a:path>
+              </a:pathLst>
+            </a:custGeom>
+            <a:solidFill>
+              <a:schemeClr val="bg2">
+                <a:lumMod val="90000"/>
+              </a:schemeClr>
+            </a:solidFill>
+            <a:ln w="9525" cap="flat">
+              <a:noFill/>
+              <a:prstDash val="solid"/>
+              <a:miter/>
+            </a:ln>
+          </p:spPr>
+          <p:txBody>
+            <a:bodyPr rtlCol="0" anchor="ctr"/>
+            <a:lstStyle/>
+            <a:p>
+              <a:endParaRPr lang="fr-FR">
+                <a:latin typeface="+mj-lt"/>
+              </a:endParaRPr>
+            </a:p>
+          </p:txBody>
+        </p:sp>
+        <p:sp>
+          <p:nvSpPr>
+            <p:cNvPr id="18" name="Forme libre : forme 17">
+              <a:extLst>
+                <a:ext uri="{FF2B5EF4-FFF2-40B4-BE49-F238E27FC236}">
+                  <a16:creationId xmlns:a16="http://schemas.microsoft.com/office/drawing/2014/main" id="{3699F293-8389-4364-8927-9B5772E5ADD6}"/>
+                </a:ext>
+              </a:extLst>
+            </p:cNvPr>
+            <p:cNvSpPr/>
+            <p:nvPr/>
+          </p:nvSpPr>
+          <p:spPr>
+            <a:xfrm>
+              <a:off x="6219955" y="2668049"/>
+              <a:ext cx="707231" cy="477006"/>
+            </a:xfrm>
+            <a:custGeom>
+              <a:avLst/>
+              <a:gdLst>
+                <a:gd name="connsiteX0" fmla="*/ 168173 w 252260"/>
+                <a:gd name="connsiteY0" fmla="*/ 168172 h 168173"/>
+                <a:gd name="connsiteX1" fmla="*/ 84087 w 252260"/>
+                <a:gd name="connsiteY1" fmla="*/ 168172 h 168173"/>
+                <a:gd name="connsiteX2" fmla="*/ 0 w 252260"/>
+                <a:gd name="connsiteY2" fmla="*/ 84086 h 168173"/>
+                <a:gd name="connsiteX3" fmla="*/ 84087 w 252260"/>
+                <a:gd name="connsiteY3" fmla="*/ -1 h 168173"/>
+                <a:gd name="connsiteX4" fmla="*/ 168173 w 252260"/>
+                <a:gd name="connsiteY4" fmla="*/ -1 h 168173"/>
+                <a:gd name="connsiteX5" fmla="*/ 252260 w 252260"/>
+                <a:gd name="connsiteY5" fmla="*/ 84086 h 168173"/>
+                <a:gd name="connsiteX6" fmla="*/ 168173 w 252260"/>
+                <a:gd name="connsiteY6" fmla="*/ 168172 h 168173"/>
+              </a:gdLst>
+              <a:ahLst/>
+              <a:cxnLst>
+                <a:cxn ang="0">
+                  <a:pos x="connsiteX0" y="connsiteY0"/>
+                </a:cxn>
+                <a:cxn ang="0">
+                  <a:pos x="connsiteX1" y="connsiteY1"/>
+                </a:cxn>
+                <a:cxn ang="0">
+                  <a:pos x="connsiteX2" y="connsiteY2"/>
+                </a:cxn>
+                <a:cxn ang="0">
+                  <a:pos x="connsiteX3" y="connsiteY3"/>
+                </a:cxn>
+                <a:cxn ang="0">
+                  <a:pos x="connsiteX4" y="connsiteY4"/>
+                </a:cxn>
+                <a:cxn ang="0">
+                  <a:pos x="connsiteX5" y="connsiteY5"/>
+                </a:cxn>
+                <a:cxn ang="0">
+                  <a:pos x="connsiteX6" y="connsiteY6"/>
+                </a:cxn>
+              </a:cxnLst>
+              <a:rect l="l" t="t" r="r" b="b"/>
+              <a:pathLst>
+                <a:path w="252260" h="168173">
+                  <a:moveTo>
+                    <a:pt x="168173" y="168172"/>
+                  </a:moveTo>
+                  <a:lnTo>
+                    <a:pt x="84087" y="168172"/>
+                  </a:lnTo>
+                  <a:cubicBezTo>
+                    <a:pt x="37671" y="168172"/>
+                    <a:pt x="0" y="130587"/>
+                    <a:pt x="0" y="84086"/>
+                  </a:cubicBezTo>
+                  <a:cubicBezTo>
+                    <a:pt x="0" y="37585"/>
+                    <a:pt x="37671" y="-1"/>
+                    <a:pt x="84087" y="-1"/>
+                  </a:cubicBezTo>
+                  <a:lnTo>
+                    <a:pt x="168173" y="-1"/>
+                  </a:lnTo>
+                  <a:cubicBezTo>
+                    <a:pt x="214589" y="-1"/>
+                    <a:pt x="252260" y="37585"/>
+                    <a:pt x="252260" y="84086"/>
+                  </a:cubicBezTo>
+                  <a:cubicBezTo>
+                    <a:pt x="252260" y="130587"/>
+                    <a:pt x="214589" y="168172"/>
+                    <a:pt x="168173" y="168172"/>
+                  </a:cubicBezTo>
+                </a:path>
+              </a:pathLst>
+            </a:custGeom>
+            <a:solidFill>
+              <a:schemeClr val="bg2">
+                <a:lumMod val="90000"/>
+              </a:schemeClr>
+            </a:solidFill>
+            <a:ln w="9525" cap="flat">
+              <a:noFill/>
+              <a:prstDash val="solid"/>
+              <a:miter/>
+            </a:ln>
+          </p:spPr>
+          <p:txBody>
+            <a:bodyPr rtlCol="0" anchor="ctr"/>
+            <a:lstStyle/>
+            <a:p>
+              <a:endParaRPr lang="fr-FR">
+                <a:latin typeface="+mj-lt"/>
+              </a:endParaRPr>
+            </a:p>
+          </p:txBody>
+        </p:sp>
+        <p:sp>
+          <p:nvSpPr>
+            <p:cNvPr id="26" name="Forme libre : forme 25">
+              <a:extLst>
+                <a:ext uri="{FF2B5EF4-FFF2-40B4-BE49-F238E27FC236}">
+                  <a16:creationId xmlns:a16="http://schemas.microsoft.com/office/drawing/2014/main" id="{B191AC93-062F-4BC1-8223-40B88DAA0F09}"/>
+                </a:ext>
+              </a:extLst>
+            </p:cNvPr>
+            <p:cNvSpPr/>
+            <p:nvPr/>
+          </p:nvSpPr>
+          <p:spPr>
+            <a:xfrm>
+              <a:off x="5401008" y="2668049"/>
+              <a:ext cx="707231" cy="477006"/>
+            </a:xfrm>
+            <a:custGeom>
+              <a:avLst/>
+              <a:gdLst>
+                <a:gd name="connsiteX0" fmla="*/ 168173 w 252260"/>
+                <a:gd name="connsiteY0" fmla="*/ 168172 h 168173"/>
+                <a:gd name="connsiteX1" fmla="*/ 84087 w 252260"/>
+                <a:gd name="connsiteY1" fmla="*/ 168172 h 168173"/>
+                <a:gd name="connsiteX2" fmla="*/ 0 w 252260"/>
+                <a:gd name="connsiteY2" fmla="*/ 84086 h 168173"/>
+                <a:gd name="connsiteX3" fmla="*/ 84087 w 252260"/>
+                <a:gd name="connsiteY3" fmla="*/ -1 h 168173"/>
+                <a:gd name="connsiteX4" fmla="*/ 168173 w 252260"/>
+                <a:gd name="connsiteY4" fmla="*/ -1 h 168173"/>
+                <a:gd name="connsiteX5" fmla="*/ 252260 w 252260"/>
+                <a:gd name="connsiteY5" fmla="*/ 84086 h 168173"/>
+                <a:gd name="connsiteX6" fmla="*/ 168173 w 252260"/>
+                <a:gd name="connsiteY6" fmla="*/ 168172 h 168173"/>
+              </a:gdLst>
+              <a:ahLst/>
+              <a:cxnLst>
+                <a:cxn ang="0">
+                  <a:pos x="connsiteX0" y="connsiteY0"/>
+                </a:cxn>
+                <a:cxn ang="0">
+                  <a:pos x="connsiteX1" y="connsiteY1"/>
+                </a:cxn>
+                <a:cxn ang="0">
+                  <a:pos x="connsiteX2" y="connsiteY2"/>
+                </a:cxn>
+                <a:cxn ang="0">
+                  <a:pos x="connsiteX3" y="connsiteY3"/>
+                </a:cxn>
+                <a:cxn ang="0">
+                  <a:pos x="connsiteX4" y="connsiteY4"/>
+                </a:cxn>
+                <a:cxn ang="0">
+                  <a:pos x="connsiteX5" y="connsiteY5"/>
+                </a:cxn>
+                <a:cxn ang="0">
+                  <a:pos x="connsiteX6" y="connsiteY6"/>
+                </a:cxn>
+              </a:cxnLst>
+              <a:rect l="l" t="t" r="r" b="b"/>
+              <a:pathLst>
+                <a:path w="252260" h="168173">
+                  <a:moveTo>
+                    <a:pt x="168173" y="168172"/>
+                  </a:moveTo>
+                  <a:lnTo>
+                    <a:pt x="84087" y="168172"/>
+                  </a:lnTo>
+                  <a:cubicBezTo>
+                    <a:pt x="37671" y="168172"/>
+                    <a:pt x="0" y="130587"/>
+                    <a:pt x="0" y="84086"/>
+                  </a:cubicBezTo>
+                  <a:cubicBezTo>
+                    <a:pt x="0" y="37585"/>
+                    <a:pt x="37671" y="-1"/>
+                    <a:pt x="84087" y="-1"/>
+                  </a:cubicBezTo>
+                  <a:lnTo>
+                    <a:pt x="168173" y="-1"/>
+                  </a:lnTo>
+                  <a:cubicBezTo>
+                    <a:pt x="214589" y="-1"/>
+                    <a:pt x="252260" y="37585"/>
+                    <a:pt x="252260" y="84086"/>
+                  </a:cubicBezTo>
+                  <a:cubicBezTo>
+                    <a:pt x="252260" y="130587"/>
+                    <a:pt x="214589" y="168172"/>
+                    <a:pt x="168173" y="168172"/>
+                  </a:cubicBezTo>
+                </a:path>
+              </a:pathLst>
+            </a:custGeom>
+            <a:solidFill>
+              <a:schemeClr val="bg2">
+                <a:lumMod val="90000"/>
+              </a:schemeClr>
+            </a:solidFill>
+            <a:ln w="9525" cap="flat">
+              <a:noFill/>
+              <a:prstDash val="solid"/>
+              <a:miter/>
+            </a:ln>
+          </p:spPr>
+          <p:txBody>
+            <a:bodyPr rtlCol="0" anchor="ctr"/>
+            <a:lstStyle/>
+            <a:p>
+              <a:endParaRPr lang="fr-FR">
+                <a:latin typeface="+mj-lt"/>
+              </a:endParaRPr>
+            </a:p>
+          </p:txBody>
+        </p:sp>
+        <p:sp>
+          <p:nvSpPr>
+            <p:cNvPr id="34" name="Forme libre : forme 33">
+              <a:extLst>
+                <a:ext uri="{FF2B5EF4-FFF2-40B4-BE49-F238E27FC236}">
+                  <a16:creationId xmlns:a16="http://schemas.microsoft.com/office/drawing/2014/main" id="{FF469F46-F69E-4333-A81E-57841AB5D815}"/>
+                </a:ext>
+              </a:extLst>
+            </p:cNvPr>
+            <p:cNvSpPr/>
+            <p:nvPr/>
+          </p:nvSpPr>
+          <p:spPr>
+            <a:xfrm>
+              <a:off x="7231740" y="2583826"/>
+              <a:ext cx="944519" cy="655446"/>
+            </a:xfrm>
+            <a:custGeom>
+              <a:avLst/>
+              <a:gdLst>
+                <a:gd name="connsiteX0" fmla="*/ 0 w 336327"/>
+                <a:gd name="connsiteY0" fmla="*/ 672664 h 672665"/>
+                <a:gd name="connsiteX1" fmla="*/ 336328 w 336327"/>
+                <a:gd name="connsiteY1" fmla="*/ 672664 h 672665"/>
+                <a:gd name="connsiteX2" fmla="*/ 336328 w 336327"/>
+                <a:gd name="connsiteY2" fmla="*/ -1 h 672665"/>
+                <a:gd name="connsiteX3" fmla="*/ 0 w 336327"/>
+                <a:gd name="connsiteY3" fmla="*/ -1 h 672665"/>
+              </a:gdLst>
+              <a:ahLst/>
+              <a:cxnLst>
+                <a:cxn ang="0">
+                  <a:pos x="connsiteX0" y="connsiteY0"/>
+                </a:cxn>
+                <a:cxn ang="0">
+                  <a:pos x="connsiteX1" y="connsiteY1"/>
+                </a:cxn>
+                <a:cxn ang="0">
+                  <a:pos x="connsiteX2" y="connsiteY2"/>
+                </a:cxn>
+                <a:cxn ang="0">
+                  <a:pos x="connsiteX3" y="connsiteY3"/>
+                </a:cxn>
+              </a:cxnLst>
+              <a:rect l="l" t="t" r="r" b="b"/>
+              <a:pathLst>
+                <a:path w="336327" h="672665">
+                  <a:moveTo>
+                    <a:pt x="0" y="672664"/>
+                  </a:moveTo>
+                  <a:lnTo>
+                    <a:pt x="336328" y="672664"/>
+                  </a:lnTo>
+                  <a:lnTo>
+                    <a:pt x="336328" y="-1"/>
+                  </a:lnTo>
+                  <a:lnTo>
+                    <a:pt x="0" y="-1"/>
+                  </a:lnTo>
+                  <a:close/>
+                </a:path>
+              </a:pathLst>
+            </a:custGeom>
+            <a:solidFill>
+              <a:srgbClr val="E64C3C"/>
+            </a:solidFill>
+            <a:ln w="9525" cap="flat">
+              <a:noFill/>
+              <a:prstDash val="solid"/>
+              <a:miter/>
+            </a:ln>
+          </p:spPr>
+          <p:txBody>
+            <a:bodyPr rtlCol="0" anchor="ctr"/>
+            <a:lstStyle/>
+            <a:p>
+              <a:endParaRPr lang="fr-FR">
+                <a:latin typeface="+mj-lt"/>
+              </a:endParaRPr>
+            </a:p>
+          </p:txBody>
+        </p:sp>
+        <p:sp>
+          <p:nvSpPr>
+            <p:cNvPr id="44" name="Forme libre : forme 43">
+              <a:extLst>
+                <a:ext uri="{FF2B5EF4-FFF2-40B4-BE49-F238E27FC236}">
+                  <a16:creationId xmlns:a16="http://schemas.microsoft.com/office/drawing/2014/main" id="{7AEEFC9F-AA30-46C2-A6F9-14B3BBADCD6D}"/>
+                </a:ext>
+              </a:extLst>
+            </p:cNvPr>
+            <p:cNvSpPr/>
+            <p:nvPr/>
+          </p:nvSpPr>
+          <p:spPr>
+            <a:xfrm>
+              <a:off x="4582060" y="3235940"/>
+              <a:ext cx="707231" cy="477006"/>
+            </a:xfrm>
+            <a:custGeom>
+              <a:avLst/>
+              <a:gdLst>
+                <a:gd name="connsiteX0" fmla="*/ 168173 w 252260"/>
+                <a:gd name="connsiteY0" fmla="*/ 168172 h 168173"/>
+                <a:gd name="connsiteX1" fmla="*/ 84087 w 252260"/>
+                <a:gd name="connsiteY1" fmla="*/ 168172 h 168173"/>
+                <a:gd name="connsiteX2" fmla="*/ 0 w 252260"/>
+                <a:gd name="connsiteY2" fmla="*/ 84086 h 168173"/>
+                <a:gd name="connsiteX3" fmla="*/ 84087 w 252260"/>
+                <a:gd name="connsiteY3" fmla="*/ -1 h 168173"/>
+                <a:gd name="connsiteX4" fmla="*/ 168173 w 252260"/>
+                <a:gd name="connsiteY4" fmla="*/ -1 h 168173"/>
+                <a:gd name="connsiteX5" fmla="*/ 252260 w 252260"/>
+                <a:gd name="connsiteY5" fmla="*/ 84086 h 168173"/>
+                <a:gd name="connsiteX6" fmla="*/ 168173 w 252260"/>
+                <a:gd name="connsiteY6" fmla="*/ 168172 h 168173"/>
+              </a:gdLst>
+              <a:ahLst/>
+              <a:cxnLst>
+                <a:cxn ang="0">
+                  <a:pos x="connsiteX0" y="connsiteY0"/>
+                </a:cxn>
+                <a:cxn ang="0">
+                  <a:pos x="connsiteX1" y="connsiteY1"/>
+                </a:cxn>
+                <a:cxn ang="0">
+                  <a:pos x="connsiteX2" y="connsiteY2"/>
+                </a:cxn>
+                <a:cxn ang="0">
+                  <a:pos x="connsiteX3" y="connsiteY3"/>
+                </a:cxn>
+                <a:cxn ang="0">
+                  <a:pos x="connsiteX4" y="connsiteY4"/>
+                </a:cxn>
+                <a:cxn ang="0">
+                  <a:pos x="connsiteX5" y="connsiteY5"/>
+                </a:cxn>
+                <a:cxn ang="0">
+                  <a:pos x="connsiteX6" y="connsiteY6"/>
+                </a:cxn>
+              </a:cxnLst>
+              <a:rect l="l" t="t" r="r" b="b"/>
+              <a:pathLst>
+                <a:path w="252260" h="168173">
+                  <a:moveTo>
+                    <a:pt x="168173" y="168172"/>
+                  </a:moveTo>
+                  <a:lnTo>
+                    <a:pt x="84087" y="168172"/>
+                  </a:lnTo>
+                  <a:cubicBezTo>
+                    <a:pt x="37671" y="168172"/>
+                    <a:pt x="0" y="130587"/>
+                    <a:pt x="0" y="84086"/>
+                  </a:cubicBezTo>
+                  <a:cubicBezTo>
+                    <a:pt x="0" y="37585"/>
+                    <a:pt x="37671" y="-1"/>
+                    <a:pt x="84087" y="-1"/>
+                  </a:cubicBezTo>
+                  <a:lnTo>
+                    <a:pt x="168173" y="-1"/>
+                  </a:lnTo>
+                  <a:cubicBezTo>
+                    <a:pt x="214589" y="-1"/>
+                    <a:pt x="252260" y="37585"/>
+                    <a:pt x="252260" y="84086"/>
+                  </a:cubicBezTo>
+                  <a:cubicBezTo>
+                    <a:pt x="252260" y="130587"/>
+                    <a:pt x="214589" y="168172"/>
+                    <a:pt x="168173" y="168172"/>
+                  </a:cubicBezTo>
+                </a:path>
+              </a:pathLst>
+            </a:custGeom>
+            <a:solidFill>
+              <a:schemeClr val="bg2">
+                <a:lumMod val="90000"/>
+              </a:schemeClr>
+            </a:solidFill>
+            <a:ln w="9525" cap="flat">
+              <a:noFill/>
+              <a:prstDash val="solid"/>
+              <a:miter/>
+            </a:ln>
+          </p:spPr>
+          <p:txBody>
+            <a:bodyPr rtlCol="0" anchor="ctr"/>
+            <a:lstStyle/>
+            <a:p>
+              <a:endParaRPr lang="fr-FR">
+                <a:latin typeface="+mj-lt"/>
+              </a:endParaRPr>
+            </a:p>
+          </p:txBody>
+        </p:sp>
+        <p:sp>
+          <p:nvSpPr>
+            <p:cNvPr id="45" name="Forme libre : forme 44">
+              <a:extLst>
+                <a:ext uri="{FF2B5EF4-FFF2-40B4-BE49-F238E27FC236}">
+                  <a16:creationId xmlns:a16="http://schemas.microsoft.com/office/drawing/2014/main" id="{744C9473-DAE1-4414-8D3E-CF58768AE5AF}"/>
+                </a:ext>
+              </a:extLst>
+            </p:cNvPr>
+            <p:cNvSpPr/>
+            <p:nvPr/>
+          </p:nvSpPr>
+          <p:spPr>
+            <a:xfrm>
+              <a:off x="6219955" y="3235940"/>
+              <a:ext cx="707231" cy="477006"/>
+            </a:xfrm>
+            <a:custGeom>
+              <a:avLst/>
+              <a:gdLst>
+                <a:gd name="connsiteX0" fmla="*/ 168173 w 252260"/>
+                <a:gd name="connsiteY0" fmla="*/ 168172 h 168173"/>
+                <a:gd name="connsiteX1" fmla="*/ 84087 w 252260"/>
+                <a:gd name="connsiteY1" fmla="*/ 168172 h 168173"/>
+                <a:gd name="connsiteX2" fmla="*/ 0 w 252260"/>
+                <a:gd name="connsiteY2" fmla="*/ 84086 h 168173"/>
+                <a:gd name="connsiteX3" fmla="*/ 84087 w 252260"/>
+                <a:gd name="connsiteY3" fmla="*/ -1 h 168173"/>
+                <a:gd name="connsiteX4" fmla="*/ 168173 w 252260"/>
+                <a:gd name="connsiteY4" fmla="*/ -1 h 168173"/>
+                <a:gd name="connsiteX5" fmla="*/ 252260 w 252260"/>
+                <a:gd name="connsiteY5" fmla="*/ 84086 h 168173"/>
+                <a:gd name="connsiteX6" fmla="*/ 168173 w 252260"/>
+                <a:gd name="connsiteY6" fmla="*/ 168172 h 168173"/>
+              </a:gdLst>
+              <a:ahLst/>
+              <a:cxnLst>
+                <a:cxn ang="0">
+                  <a:pos x="connsiteX0" y="connsiteY0"/>
+                </a:cxn>
+                <a:cxn ang="0">
+                  <a:pos x="connsiteX1" y="connsiteY1"/>
+                </a:cxn>
+                <a:cxn ang="0">
+                  <a:pos x="connsiteX2" y="connsiteY2"/>
+                </a:cxn>
+                <a:cxn ang="0">
+                  <a:pos x="connsiteX3" y="connsiteY3"/>
+                </a:cxn>
+                <a:cxn ang="0">
+                  <a:pos x="connsiteX4" y="connsiteY4"/>
+                </a:cxn>
+                <a:cxn ang="0">
+                  <a:pos x="connsiteX5" y="connsiteY5"/>
+                </a:cxn>
+                <a:cxn ang="0">
+                  <a:pos x="connsiteX6" y="connsiteY6"/>
+                </a:cxn>
+              </a:cxnLst>
+              <a:rect l="l" t="t" r="r" b="b"/>
+              <a:pathLst>
+                <a:path w="252260" h="168173">
+                  <a:moveTo>
+                    <a:pt x="168173" y="168172"/>
+                  </a:moveTo>
+                  <a:lnTo>
+                    <a:pt x="84087" y="168172"/>
+                  </a:lnTo>
+                  <a:cubicBezTo>
+                    <a:pt x="37671" y="168172"/>
+                    <a:pt x="0" y="130587"/>
+                    <a:pt x="0" y="84086"/>
+                  </a:cubicBezTo>
+                  <a:cubicBezTo>
+                    <a:pt x="0" y="37585"/>
+                    <a:pt x="37671" y="-1"/>
+                    <a:pt x="84087" y="-1"/>
+                  </a:cubicBezTo>
+                  <a:lnTo>
+                    <a:pt x="168173" y="-1"/>
+                  </a:lnTo>
+                  <a:cubicBezTo>
+                    <a:pt x="214589" y="-1"/>
+                    <a:pt x="252260" y="37585"/>
+                    <a:pt x="252260" y="84086"/>
+                  </a:cubicBezTo>
+                  <a:cubicBezTo>
+                    <a:pt x="252260" y="130587"/>
+                    <a:pt x="214589" y="168172"/>
+                    <a:pt x="168173" y="168172"/>
+                  </a:cubicBezTo>
+                </a:path>
+              </a:pathLst>
+            </a:custGeom>
+            <a:solidFill>
+              <a:schemeClr val="bg2">
+                <a:lumMod val="90000"/>
+              </a:schemeClr>
+            </a:solidFill>
+            <a:ln w="9525" cap="flat">
+              <a:noFill/>
+              <a:prstDash val="solid"/>
+              <a:miter/>
+            </a:ln>
+          </p:spPr>
+          <p:txBody>
+            <a:bodyPr rtlCol="0" anchor="ctr"/>
+            <a:lstStyle/>
+            <a:p>
+              <a:endParaRPr lang="fr-FR">
+                <a:latin typeface="+mj-lt"/>
+              </a:endParaRPr>
+            </a:p>
+          </p:txBody>
+        </p:sp>
+        <p:sp>
+          <p:nvSpPr>
+            <p:cNvPr id="46" name="Forme libre : forme 45">
+              <a:extLst>
+                <a:ext uri="{FF2B5EF4-FFF2-40B4-BE49-F238E27FC236}">
+                  <a16:creationId xmlns:a16="http://schemas.microsoft.com/office/drawing/2014/main" id="{9B9E4F86-8192-4F5D-AE4F-5ADBB0643348}"/>
+                </a:ext>
+              </a:extLst>
+            </p:cNvPr>
+            <p:cNvSpPr/>
+            <p:nvPr/>
+          </p:nvSpPr>
+          <p:spPr>
+            <a:xfrm>
+              <a:off x="5401008" y="3235940"/>
+              <a:ext cx="707231" cy="477006"/>
+            </a:xfrm>
+            <a:custGeom>
+              <a:avLst/>
+              <a:gdLst>
+                <a:gd name="connsiteX0" fmla="*/ 168173 w 252260"/>
+                <a:gd name="connsiteY0" fmla="*/ 168172 h 168173"/>
+                <a:gd name="connsiteX1" fmla="*/ 84087 w 252260"/>
+                <a:gd name="connsiteY1" fmla="*/ 168172 h 168173"/>
+                <a:gd name="connsiteX2" fmla="*/ 0 w 252260"/>
+                <a:gd name="connsiteY2" fmla="*/ 84086 h 168173"/>
+                <a:gd name="connsiteX3" fmla="*/ 84087 w 252260"/>
+                <a:gd name="connsiteY3" fmla="*/ -1 h 168173"/>
+                <a:gd name="connsiteX4" fmla="*/ 168173 w 252260"/>
+                <a:gd name="connsiteY4" fmla="*/ -1 h 168173"/>
+                <a:gd name="connsiteX5" fmla="*/ 252260 w 252260"/>
+                <a:gd name="connsiteY5" fmla="*/ 84086 h 168173"/>
+                <a:gd name="connsiteX6" fmla="*/ 168173 w 252260"/>
+                <a:gd name="connsiteY6" fmla="*/ 168172 h 168173"/>
+              </a:gdLst>
+              <a:ahLst/>
+              <a:cxnLst>
+                <a:cxn ang="0">
+                  <a:pos x="connsiteX0" y="connsiteY0"/>
+                </a:cxn>
+                <a:cxn ang="0">
+                  <a:pos x="connsiteX1" y="connsiteY1"/>
+                </a:cxn>
+                <a:cxn ang="0">
+                  <a:pos x="connsiteX2" y="connsiteY2"/>
+                </a:cxn>
+                <a:cxn ang="0">
+                  <a:pos x="connsiteX3" y="connsiteY3"/>
+                </a:cxn>
+                <a:cxn ang="0">
+                  <a:pos x="connsiteX4" y="connsiteY4"/>
+                </a:cxn>
+                <a:cxn ang="0">
+                  <a:pos x="connsiteX5" y="connsiteY5"/>
+                </a:cxn>
+                <a:cxn ang="0">
+                  <a:pos x="connsiteX6" y="connsiteY6"/>
+                </a:cxn>
+              </a:cxnLst>
+              <a:rect l="l" t="t" r="r" b="b"/>
+              <a:pathLst>
+                <a:path w="252260" h="168173">
+                  <a:moveTo>
+                    <a:pt x="168173" y="168172"/>
+                  </a:moveTo>
+                  <a:lnTo>
+                    <a:pt x="84087" y="168172"/>
+                  </a:lnTo>
+                  <a:cubicBezTo>
+                    <a:pt x="37671" y="168172"/>
+                    <a:pt x="0" y="130587"/>
+                    <a:pt x="0" y="84086"/>
+                  </a:cubicBezTo>
+                  <a:cubicBezTo>
+                    <a:pt x="0" y="37585"/>
+                    <a:pt x="37671" y="-1"/>
+                    <a:pt x="84087" y="-1"/>
+                  </a:cubicBezTo>
+                  <a:lnTo>
+                    <a:pt x="168173" y="-1"/>
+                  </a:lnTo>
+                  <a:cubicBezTo>
+                    <a:pt x="214589" y="-1"/>
+                    <a:pt x="252260" y="37585"/>
+                    <a:pt x="252260" y="84086"/>
+                  </a:cubicBezTo>
+                  <a:cubicBezTo>
+                    <a:pt x="252260" y="130587"/>
+                    <a:pt x="214589" y="168172"/>
+                    <a:pt x="168173" y="168172"/>
+                  </a:cubicBezTo>
+                </a:path>
+              </a:pathLst>
+            </a:custGeom>
+            <a:solidFill>
+              <a:schemeClr val="bg2">
+                <a:lumMod val="90000"/>
+              </a:schemeClr>
+            </a:solidFill>
+            <a:ln w="9525" cap="flat">
+              <a:noFill/>
+              <a:prstDash val="solid"/>
+              <a:miter/>
+            </a:ln>
+          </p:spPr>
+          <p:txBody>
+            <a:bodyPr rtlCol="0" anchor="ctr"/>
+            <a:lstStyle/>
+            <a:p>
+              <a:endParaRPr lang="fr-FR">
+                <a:latin typeface="+mj-lt"/>
+              </a:endParaRPr>
+            </a:p>
+          </p:txBody>
+        </p:sp>
+        <p:sp>
+          <p:nvSpPr>
+            <p:cNvPr id="47" name="Forme libre : forme 46">
+              <a:extLst>
+                <a:ext uri="{FF2B5EF4-FFF2-40B4-BE49-F238E27FC236}">
+                  <a16:creationId xmlns:a16="http://schemas.microsoft.com/office/drawing/2014/main" id="{9563C434-55DE-403C-9874-B1667AFD7E18}"/>
+                </a:ext>
+              </a:extLst>
+            </p:cNvPr>
+            <p:cNvSpPr/>
+            <p:nvPr/>
+          </p:nvSpPr>
+          <p:spPr>
+            <a:xfrm>
+              <a:off x="4582060" y="3803831"/>
+              <a:ext cx="707231" cy="477006"/>
+            </a:xfrm>
+            <a:custGeom>
+              <a:avLst/>
+              <a:gdLst>
+                <a:gd name="connsiteX0" fmla="*/ 168173 w 252260"/>
+                <a:gd name="connsiteY0" fmla="*/ 168172 h 168173"/>
+                <a:gd name="connsiteX1" fmla="*/ 84087 w 252260"/>
+                <a:gd name="connsiteY1" fmla="*/ 168172 h 168173"/>
+                <a:gd name="connsiteX2" fmla="*/ 0 w 252260"/>
+                <a:gd name="connsiteY2" fmla="*/ 84086 h 168173"/>
+                <a:gd name="connsiteX3" fmla="*/ 84087 w 252260"/>
+                <a:gd name="connsiteY3" fmla="*/ -1 h 168173"/>
+                <a:gd name="connsiteX4" fmla="*/ 168173 w 252260"/>
+                <a:gd name="connsiteY4" fmla="*/ -1 h 168173"/>
+                <a:gd name="connsiteX5" fmla="*/ 252260 w 252260"/>
+                <a:gd name="connsiteY5" fmla="*/ 84086 h 168173"/>
+                <a:gd name="connsiteX6" fmla="*/ 168173 w 252260"/>
+                <a:gd name="connsiteY6" fmla="*/ 168172 h 168173"/>
+              </a:gdLst>
+              <a:ahLst/>
+              <a:cxnLst>
+                <a:cxn ang="0">
+                  <a:pos x="connsiteX0" y="connsiteY0"/>
+                </a:cxn>
+                <a:cxn ang="0">
+                  <a:pos x="connsiteX1" y="connsiteY1"/>
+                </a:cxn>
+                <a:cxn ang="0">
+                  <a:pos x="connsiteX2" y="connsiteY2"/>
+                </a:cxn>
+                <a:cxn ang="0">
+                  <a:pos x="connsiteX3" y="connsiteY3"/>
+                </a:cxn>
+                <a:cxn ang="0">
+                  <a:pos x="connsiteX4" y="connsiteY4"/>
+                </a:cxn>
+                <a:cxn ang="0">
+                  <a:pos x="connsiteX5" y="connsiteY5"/>
+                </a:cxn>
+                <a:cxn ang="0">
+                  <a:pos x="connsiteX6" y="connsiteY6"/>
+                </a:cxn>
+              </a:cxnLst>
+              <a:rect l="l" t="t" r="r" b="b"/>
+              <a:pathLst>
+                <a:path w="252260" h="168173">
+                  <a:moveTo>
+                    <a:pt x="168173" y="168172"/>
+                  </a:moveTo>
+                  <a:lnTo>
+                    <a:pt x="84087" y="168172"/>
+                  </a:lnTo>
+                  <a:cubicBezTo>
+                    <a:pt x="37671" y="168172"/>
+                    <a:pt x="0" y="130587"/>
+                    <a:pt x="0" y="84086"/>
+                  </a:cubicBezTo>
+                  <a:cubicBezTo>
+                    <a:pt x="0" y="37585"/>
+                    <a:pt x="37671" y="-1"/>
+                    <a:pt x="84087" y="-1"/>
+                  </a:cubicBezTo>
+                  <a:lnTo>
+                    <a:pt x="168173" y="-1"/>
+                  </a:lnTo>
+                  <a:cubicBezTo>
+                    <a:pt x="214589" y="-1"/>
+                    <a:pt x="252260" y="37585"/>
+                    <a:pt x="252260" y="84086"/>
+                  </a:cubicBezTo>
+                  <a:cubicBezTo>
+                    <a:pt x="252260" y="130587"/>
+                    <a:pt x="214589" y="168172"/>
+                    <a:pt x="168173" y="168172"/>
+                  </a:cubicBezTo>
+                </a:path>
+              </a:pathLst>
+            </a:custGeom>
+            <a:solidFill>
+              <a:schemeClr val="bg2">
+                <a:lumMod val="90000"/>
+              </a:schemeClr>
+            </a:solidFill>
+            <a:ln w="9525" cap="flat">
+              <a:noFill/>
+              <a:prstDash val="solid"/>
+              <a:miter/>
+            </a:ln>
+          </p:spPr>
+          <p:txBody>
+            <a:bodyPr rtlCol="0" anchor="ctr"/>
+            <a:lstStyle/>
+            <a:p>
+              <a:endParaRPr lang="fr-FR">
+                <a:latin typeface="+mj-lt"/>
+              </a:endParaRPr>
+            </a:p>
+          </p:txBody>
+        </p:sp>
+        <p:sp>
+          <p:nvSpPr>
+            <p:cNvPr id="48" name="Forme libre : forme 47">
+              <a:extLst>
+                <a:ext uri="{FF2B5EF4-FFF2-40B4-BE49-F238E27FC236}">
+                  <a16:creationId xmlns:a16="http://schemas.microsoft.com/office/drawing/2014/main" id="{775B52D2-3C57-4C12-8736-6EFAA73BA38D}"/>
+                </a:ext>
+              </a:extLst>
+            </p:cNvPr>
+            <p:cNvSpPr/>
+            <p:nvPr/>
+          </p:nvSpPr>
+          <p:spPr>
+            <a:xfrm>
+              <a:off x="6219955" y="3803831"/>
+              <a:ext cx="707231" cy="477006"/>
+            </a:xfrm>
+            <a:custGeom>
+              <a:avLst/>
+              <a:gdLst>
+                <a:gd name="connsiteX0" fmla="*/ 168173 w 252260"/>
+                <a:gd name="connsiteY0" fmla="*/ 168172 h 168173"/>
+                <a:gd name="connsiteX1" fmla="*/ 84087 w 252260"/>
+                <a:gd name="connsiteY1" fmla="*/ 168172 h 168173"/>
+                <a:gd name="connsiteX2" fmla="*/ 0 w 252260"/>
+                <a:gd name="connsiteY2" fmla="*/ 84086 h 168173"/>
+                <a:gd name="connsiteX3" fmla="*/ 84087 w 252260"/>
+                <a:gd name="connsiteY3" fmla="*/ -1 h 168173"/>
+                <a:gd name="connsiteX4" fmla="*/ 168173 w 252260"/>
+                <a:gd name="connsiteY4" fmla="*/ -1 h 168173"/>
+                <a:gd name="connsiteX5" fmla="*/ 252260 w 252260"/>
+                <a:gd name="connsiteY5" fmla="*/ 84086 h 168173"/>
+                <a:gd name="connsiteX6" fmla="*/ 168173 w 252260"/>
+                <a:gd name="connsiteY6" fmla="*/ 168172 h 168173"/>
+              </a:gdLst>
+              <a:ahLst/>
+              <a:cxnLst>
+                <a:cxn ang="0">
+                  <a:pos x="connsiteX0" y="connsiteY0"/>
+                </a:cxn>
+                <a:cxn ang="0">
+                  <a:pos x="connsiteX1" y="connsiteY1"/>
+                </a:cxn>
+                <a:cxn ang="0">
+                  <a:pos x="connsiteX2" y="connsiteY2"/>
+                </a:cxn>
+                <a:cxn ang="0">
+                  <a:pos x="connsiteX3" y="connsiteY3"/>
+                </a:cxn>
+                <a:cxn ang="0">
+                  <a:pos x="connsiteX4" y="connsiteY4"/>
+                </a:cxn>
+                <a:cxn ang="0">
+                  <a:pos x="connsiteX5" y="connsiteY5"/>
+                </a:cxn>
+                <a:cxn ang="0">
+                  <a:pos x="connsiteX6" y="connsiteY6"/>
+                </a:cxn>
+              </a:cxnLst>
+              <a:rect l="l" t="t" r="r" b="b"/>
+              <a:pathLst>
+                <a:path w="252260" h="168173">
+                  <a:moveTo>
+                    <a:pt x="168173" y="168172"/>
+                  </a:moveTo>
+                  <a:lnTo>
+                    <a:pt x="84087" y="168172"/>
+                  </a:lnTo>
+                  <a:cubicBezTo>
+                    <a:pt x="37671" y="168172"/>
+                    <a:pt x="0" y="130587"/>
+                    <a:pt x="0" y="84086"/>
+                  </a:cubicBezTo>
+                  <a:cubicBezTo>
+                    <a:pt x="0" y="37585"/>
+                    <a:pt x="37671" y="-1"/>
+                    <a:pt x="84087" y="-1"/>
+                  </a:cubicBezTo>
+                  <a:lnTo>
+                    <a:pt x="168173" y="-1"/>
+                  </a:lnTo>
+                  <a:cubicBezTo>
+                    <a:pt x="214589" y="-1"/>
+                    <a:pt x="252260" y="37585"/>
+                    <a:pt x="252260" y="84086"/>
+                  </a:cubicBezTo>
+                  <a:cubicBezTo>
+                    <a:pt x="252260" y="130587"/>
+                    <a:pt x="214589" y="168172"/>
+                    <a:pt x="168173" y="168172"/>
+                  </a:cubicBezTo>
+                </a:path>
+              </a:pathLst>
+            </a:custGeom>
+            <a:solidFill>
+              <a:schemeClr val="bg2">
+                <a:lumMod val="90000"/>
+              </a:schemeClr>
+            </a:solidFill>
+            <a:ln w="9525" cap="flat">
+              <a:noFill/>
+              <a:prstDash val="solid"/>
+              <a:miter/>
+            </a:ln>
+          </p:spPr>
+          <p:txBody>
+            <a:bodyPr rtlCol="0" anchor="ctr"/>
+            <a:lstStyle/>
+            <a:p>
+              <a:endParaRPr lang="fr-FR">
+                <a:latin typeface="+mj-lt"/>
+              </a:endParaRPr>
+            </a:p>
+          </p:txBody>
+        </p:sp>
+        <p:sp>
+          <p:nvSpPr>
+            <p:cNvPr id="49" name="Forme libre : forme 48">
+              <a:extLst>
+                <a:ext uri="{FF2B5EF4-FFF2-40B4-BE49-F238E27FC236}">
+                  <a16:creationId xmlns:a16="http://schemas.microsoft.com/office/drawing/2014/main" id="{64205830-A6AE-4B08-8C8A-CF74465578B3}"/>
+                </a:ext>
+              </a:extLst>
+            </p:cNvPr>
+            <p:cNvSpPr/>
+            <p:nvPr/>
+          </p:nvSpPr>
+          <p:spPr>
+            <a:xfrm>
+              <a:off x="5401008" y="3803831"/>
+              <a:ext cx="707231" cy="477006"/>
+            </a:xfrm>
+            <a:custGeom>
+              <a:avLst/>
+              <a:gdLst>
+                <a:gd name="connsiteX0" fmla="*/ 168173 w 252260"/>
+                <a:gd name="connsiteY0" fmla="*/ 168172 h 168173"/>
+                <a:gd name="connsiteX1" fmla="*/ 84087 w 252260"/>
+                <a:gd name="connsiteY1" fmla="*/ 168172 h 168173"/>
+                <a:gd name="connsiteX2" fmla="*/ 0 w 252260"/>
+                <a:gd name="connsiteY2" fmla="*/ 84086 h 168173"/>
+                <a:gd name="connsiteX3" fmla="*/ 84087 w 252260"/>
+                <a:gd name="connsiteY3" fmla="*/ -1 h 168173"/>
+                <a:gd name="connsiteX4" fmla="*/ 168173 w 252260"/>
+                <a:gd name="connsiteY4" fmla="*/ -1 h 168173"/>
+                <a:gd name="connsiteX5" fmla="*/ 252260 w 252260"/>
+                <a:gd name="connsiteY5" fmla="*/ 84086 h 168173"/>
+                <a:gd name="connsiteX6" fmla="*/ 168173 w 252260"/>
+                <a:gd name="connsiteY6" fmla="*/ 168172 h 168173"/>
+              </a:gdLst>
+              <a:ahLst/>
+              <a:cxnLst>
+                <a:cxn ang="0">
+                  <a:pos x="connsiteX0" y="connsiteY0"/>
+                </a:cxn>
+                <a:cxn ang="0">
+                  <a:pos x="connsiteX1" y="connsiteY1"/>
+                </a:cxn>
+                <a:cxn ang="0">
+                  <a:pos x="connsiteX2" y="connsiteY2"/>
+                </a:cxn>
+                <a:cxn ang="0">
+                  <a:pos x="connsiteX3" y="connsiteY3"/>
+                </a:cxn>
+                <a:cxn ang="0">
+                  <a:pos x="connsiteX4" y="connsiteY4"/>
+                </a:cxn>
+                <a:cxn ang="0">
+                  <a:pos x="connsiteX5" y="connsiteY5"/>
+                </a:cxn>
+                <a:cxn ang="0">
+                  <a:pos x="connsiteX6" y="connsiteY6"/>
+                </a:cxn>
+              </a:cxnLst>
+              <a:rect l="l" t="t" r="r" b="b"/>
+              <a:pathLst>
+                <a:path w="252260" h="168173">
+                  <a:moveTo>
+                    <a:pt x="168173" y="168172"/>
+                  </a:moveTo>
+                  <a:lnTo>
+                    <a:pt x="84087" y="168172"/>
+                  </a:lnTo>
+                  <a:cubicBezTo>
+                    <a:pt x="37671" y="168172"/>
+                    <a:pt x="0" y="130587"/>
+                    <a:pt x="0" y="84086"/>
+                  </a:cubicBezTo>
+                  <a:cubicBezTo>
+                    <a:pt x="0" y="37585"/>
+                    <a:pt x="37671" y="-1"/>
+                    <a:pt x="84087" y="-1"/>
+                  </a:cubicBezTo>
+                  <a:lnTo>
+                    <a:pt x="168173" y="-1"/>
+                  </a:lnTo>
+                  <a:cubicBezTo>
+                    <a:pt x="214589" y="-1"/>
+                    <a:pt x="252260" y="37585"/>
+                    <a:pt x="252260" y="84086"/>
+                  </a:cubicBezTo>
+                  <a:cubicBezTo>
+                    <a:pt x="252260" y="130587"/>
+                    <a:pt x="214589" y="168172"/>
+                    <a:pt x="168173" y="168172"/>
+                  </a:cubicBezTo>
+                </a:path>
+              </a:pathLst>
+            </a:custGeom>
+            <a:solidFill>
+              <a:schemeClr val="bg2">
+                <a:lumMod val="90000"/>
+              </a:schemeClr>
+            </a:solidFill>
+            <a:ln w="9525" cap="flat">
+              <a:noFill/>
+              <a:prstDash val="solid"/>
+              <a:miter/>
+            </a:ln>
+          </p:spPr>
+          <p:txBody>
+            <a:bodyPr rtlCol="0" anchor="ctr"/>
+            <a:lstStyle/>
+            <a:p>
+              <a:endParaRPr lang="fr-FR">
+                <a:latin typeface="+mj-lt"/>
+              </a:endParaRPr>
+            </a:p>
+          </p:txBody>
+        </p:sp>
+        <p:sp>
+          <p:nvSpPr>
+            <p:cNvPr id="50" name="Forme libre : forme 49">
+              <a:extLst>
+                <a:ext uri="{FF2B5EF4-FFF2-40B4-BE49-F238E27FC236}">
+                  <a16:creationId xmlns:a16="http://schemas.microsoft.com/office/drawing/2014/main" id="{3CC320D5-393C-482E-881D-BCCF78A3AB1B}"/>
+                </a:ext>
+              </a:extLst>
+            </p:cNvPr>
+            <p:cNvSpPr/>
+            <p:nvPr/>
+          </p:nvSpPr>
+          <p:spPr>
+            <a:xfrm>
+              <a:off x="4582060" y="4371722"/>
+              <a:ext cx="707231" cy="477006"/>
+            </a:xfrm>
+            <a:custGeom>
+              <a:avLst/>
+              <a:gdLst>
+                <a:gd name="connsiteX0" fmla="*/ 168173 w 252260"/>
+                <a:gd name="connsiteY0" fmla="*/ 168172 h 168173"/>
+                <a:gd name="connsiteX1" fmla="*/ 84087 w 252260"/>
+                <a:gd name="connsiteY1" fmla="*/ 168172 h 168173"/>
+                <a:gd name="connsiteX2" fmla="*/ 0 w 252260"/>
+                <a:gd name="connsiteY2" fmla="*/ 84086 h 168173"/>
+                <a:gd name="connsiteX3" fmla="*/ 84087 w 252260"/>
+                <a:gd name="connsiteY3" fmla="*/ -1 h 168173"/>
+                <a:gd name="connsiteX4" fmla="*/ 168173 w 252260"/>
+                <a:gd name="connsiteY4" fmla="*/ -1 h 168173"/>
+                <a:gd name="connsiteX5" fmla="*/ 252260 w 252260"/>
+                <a:gd name="connsiteY5" fmla="*/ 84086 h 168173"/>
+                <a:gd name="connsiteX6" fmla="*/ 168173 w 252260"/>
+                <a:gd name="connsiteY6" fmla="*/ 168172 h 168173"/>
+              </a:gdLst>
+              <a:ahLst/>
+              <a:cxnLst>
+                <a:cxn ang="0">
+                  <a:pos x="connsiteX0" y="connsiteY0"/>
+                </a:cxn>
+                <a:cxn ang="0">
+                  <a:pos x="connsiteX1" y="connsiteY1"/>
+                </a:cxn>
+                <a:cxn ang="0">
+                  <a:pos x="connsiteX2" y="connsiteY2"/>
+                </a:cxn>
+                <a:cxn ang="0">
+                  <a:pos x="connsiteX3" y="connsiteY3"/>
+                </a:cxn>
+                <a:cxn ang="0">
+                  <a:pos x="connsiteX4" y="connsiteY4"/>
+                </a:cxn>
+                <a:cxn ang="0">
+                  <a:pos x="connsiteX5" y="connsiteY5"/>
+                </a:cxn>
+                <a:cxn ang="0">
+                  <a:pos x="connsiteX6" y="connsiteY6"/>
+                </a:cxn>
+              </a:cxnLst>
+              <a:rect l="l" t="t" r="r" b="b"/>
+              <a:pathLst>
+                <a:path w="252260" h="168173">
+                  <a:moveTo>
+                    <a:pt x="168173" y="168172"/>
+                  </a:moveTo>
+                  <a:lnTo>
+                    <a:pt x="84087" y="168172"/>
+                  </a:lnTo>
+                  <a:cubicBezTo>
+                    <a:pt x="37671" y="168172"/>
+                    <a:pt x="0" y="130587"/>
+                    <a:pt x="0" y="84086"/>
+                  </a:cubicBezTo>
+                  <a:cubicBezTo>
+                    <a:pt x="0" y="37585"/>
+                    <a:pt x="37671" y="-1"/>
+                    <a:pt x="84087" y="-1"/>
+                  </a:cubicBezTo>
+                  <a:lnTo>
+                    <a:pt x="168173" y="-1"/>
+                  </a:lnTo>
+                  <a:cubicBezTo>
+                    <a:pt x="214589" y="-1"/>
+                    <a:pt x="252260" y="37585"/>
+                    <a:pt x="252260" y="84086"/>
+                  </a:cubicBezTo>
+                  <a:cubicBezTo>
+                    <a:pt x="252260" y="130587"/>
+                    <a:pt x="214589" y="168172"/>
+                    <a:pt x="168173" y="168172"/>
+                  </a:cubicBezTo>
+                </a:path>
+              </a:pathLst>
+            </a:custGeom>
+            <a:solidFill>
+              <a:schemeClr val="bg2">
+                <a:lumMod val="90000"/>
+              </a:schemeClr>
+            </a:solidFill>
+            <a:ln w="9525" cap="flat">
+              <a:noFill/>
+              <a:prstDash val="solid"/>
+              <a:miter/>
+            </a:ln>
+          </p:spPr>
+          <p:txBody>
+            <a:bodyPr rtlCol="0" anchor="ctr"/>
+            <a:lstStyle/>
+            <a:p>
+              <a:endParaRPr lang="fr-FR">
+                <a:latin typeface="+mj-lt"/>
+              </a:endParaRPr>
+            </a:p>
+          </p:txBody>
+        </p:sp>
+        <p:sp>
+          <p:nvSpPr>
+            <p:cNvPr id="51" name="Forme libre : forme 50">
+              <a:extLst>
+                <a:ext uri="{FF2B5EF4-FFF2-40B4-BE49-F238E27FC236}">
+                  <a16:creationId xmlns:a16="http://schemas.microsoft.com/office/drawing/2014/main" id="{14DC5EC5-0101-4ADC-897F-346B98BF4820}"/>
+                </a:ext>
+              </a:extLst>
+            </p:cNvPr>
+            <p:cNvSpPr/>
+            <p:nvPr/>
+          </p:nvSpPr>
+          <p:spPr>
+            <a:xfrm>
+              <a:off x="6219955" y="4371722"/>
+              <a:ext cx="707231" cy="477006"/>
+            </a:xfrm>
+            <a:custGeom>
+              <a:avLst/>
+              <a:gdLst>
+                <a:gd name="connsiteX0" fmla="*/ 168173 w 252260"/>
+                <a:gd name="connsiteY0" fmla="*/ 168172 h 168173"/>
+                <a:gd name="connsiteX1" fmla="*/ 84087 w 252260"/>
+                <a:gd name="connsiteY1" fmla="*/ 168172 h 168173"/>
+                <a:gd name="connsiteX2" fmla="*/ 0 w 252260"/>
+                <a:gd name="connsiteY2" fmla="*/ 84086 h 168173"/>
+                <a:gd name="connsiteX3" fmla="*/ 84087 w 252260"/>
+                <a:gd name="connsiteY3" fmla="*/ -1 h 168173"/>
+                <a:gd name="connsiteX4" fmla="*/ 168173 w 252260"/>
+                <a:gd name="connsiteY4" fmla="*/ -1 h 168173"/>
+                <a:gd name="connsiteX5" fmla="*/ 252260 w 252260"/>
+                <a:gd name="connsiteY5" fmla="*/ 84086 h 168173"/>
+                <a:gd name="connsiteX6" fmla="*/ 168173 w 252260"/>
+                <a:gd name="connsiteY6" fmla="*/ 168172 h 168173"/>
+              </a:gdLst>
+              <a:ahLst/>
+              <a:cxnLst>
+                <a:cxn ang="0">
+                  <a:pos x="connsiteX0" y="connsiteY0"/>
+                </a:cxn>
+                <a:cxn ang="0">
+                  <a:pos x="connsiteX1" y="connsiteY1"/>
+                </a:cxn>
+                <a:cxn ang="0">
+                  <a:pos x="connsiteX2" y="connsiteY2"/>
+                </a:cxn>
+                <a:cxn ang="0">
+                  <a:pos x="connsiteX3" y="connsiteY3"/>
+                </a:cxn>
+                <a:cxn ang="0">
+                  <a:pos x="connsiteX4" y="connsiteY4"/>
+                </a:cxn>
+                <a:cxn ang="0">
+                  <a:pos x="connsiteX5" y="connsiteY5"/>
+                </a:cxn>
+                <a:cxn ang="0">
+                  <a:pos x="connsiteX6" y="connsiteY6"/>
+                </a:cxn>
+              </a:cxnLst>
+              <a:rect l="l" t="t" r="r" b="b"/>
+              <a:pathLst>
+                <a:path w="252260" h="168173">
+                  <a:moveTo>
+                    <a:pt x="168173" y="168172"/>
+                  </a:moveTo>
+                  <a:lnTo>
+                    <a:pt x="84087" y="168172"/>
+                  </a:lnTo>
+                  <a:cubicBezTo>
+                    <a:pt x="37671" y="168172"/>
+                    <a:pt x="0" y="130587"/>
+                    <a:pt x="0" y="84086"/>
+                  </a:cubicBezTo>
+                  <a:cubicBezTo>
+                    <a:pt x="0" y="37585"/>
+                    <a:pt x="37671" y="-1"/>
+                    <a:pt x="84087" y="-1"/>
+                  </a:cubicBezTo>
+                  <a:lnTo>
+                    <a:pt x="168173" y="-1"/>
+                  </a:lnTo>
+                  <a:cubicBezTo>
+                    <a:pt x="214589" y="-1"/>
+                    <a:pt x="252260" y="37585"/>
+                    <a:pt x="252260" y="84086"/>
+                  </a:cubicBezTo>
+                  <a:cubicBezTo>
+                    <a:pt x="252260" y="130587"/>
+                    <a:pt x="214589" y="168172"/>
+                    <a:pt x="168173" y="168172"/>
+                  </a:cubicBezTo>
+                </a:path>
+              </a:pathLst>
+            </a:custGeom>
+            <a:solidFill>
+              <a:schemeClr val="bg2">
+                <a:lumMod val="90000"/>
+              </a:schemeClr>
+            </a:solidFill>
+            <a:ln w="9525" cap="flat">
+              <a:noFill/>
+              <a:prstDash val="solid"/>
+              <a:miter/>
+            </a:ln>
+          </p:spPr>
+          <p:txBody>
+            <a:bodyPr rtlCol="0" anchor="ctr"/>
+            <a:lstStyle/>
+            <a:p>
+              <a:endParaRPr lang="fr-FR">
+                <a:latin typeface="+mj-lt"/>
+              </a:endParaRPr>
+            </a:p>
+          </p:txBody>
+        </p:sp>
+        <p:sp>
+          <p:nvSpPr>
+            <p:cNvPr id="52" name="Forme libre : forme 51">
+              <a:extLst>
+                <a:ext uri="{FF2B5EF4-FFF2-40B4-BE49-F238E27FC236}">
+                  <a16:creationId xmlns:a16="http://schemas.microsoft.com/office/drawing/2014/main" id="{8B72957B-4A09-4D99-ABC8-38BB67945471}"/>
+                </a:ext>
+              </a:extLst>
+            </p:cNvPr>
+            <p:cNvSpPr/>
+            <p:nvPr/>
+          </p:nvSpPr>
+          <p:spPr>
+            <a:xfrm>
+              <a:off x="5401008" y="4371722"/>
+              <a:ext cx="707231" cy="477006"/>
+            </a:xfrm>
+            <a:custGeom>
+              <a:avLst/>
+              <a:gdLst>
+                <a:gd name="connsiteX0" fmla="*/ 168173 w 252260"/>
+                <a:gd name="connsiteY0" fmla="*/ 168172 h 168173"/>
+                <a:gd name="connsiteX1" fmla="*/ 84087 w 252260"/>
+                <a:gd name="connsiteY1" fmla="*/ 168172 h 168173"/>
+                <a:gd name="connsiteX2" fmla="*/ 0 w 252260"/>
+                <a:gd name="connsiteY2" fmla="*/ 84086 h 168173"/>
+                <a:gd name="connsiteX3" fmla="*/ 84087 w 252260"/>
+                <a:gd name="connsiteY3" fmla="*/ -1 h 168173"/>
+                <a:gd name="connsiteX4" fmla="*/ 168173 w 252260"/>
+                <a:gd name="connsiteY4" fmla="*/ -1 h 168173"/>
+                <a:gd name="connsiteX5" fmla="*/ 252260 w 252260"/>
+                <a:gd name="connsiteY5" fmla="*/ 84086 h 168173"/>
+                <a:gd name="connsiteX6" fmla="*/ 168173 w 252260"/>
+                <a:gd name="connsiteY6" fmla="*/ 168172 h 168173"/>
+              </a:gdLst>
+              <a:ahLst/>
+              <a:cxnLst>
+                <a:cxn ang="0">
+                  <a:pos x="connsiteX0" y="connsiteY0"/>
+                </a:cxn>
+                <a:cxn ang="0">
+                  <a:pos x="connsiteX1" y="connsiteY1"/>
+                </a:cxn>
+                <a:cxn ang="0">
+                  <a:pos x="connsiteX2" y="connsiteY2"/>
+                </a:cxn>
+                <a:cxn ang="0">
+                  <a:pos x="connsiteX3" y="connsiteY3"/>
+                </a:cxn>
+                <a:cxn ang="0">
+                  <a:pos x="connsiteX4" y="connsiteY4"/>
+                </a:cxn>
+                <a:cxn ang="0">
+                  <a:pos x="connsiteX5" y="connsiteY5"/>
+                </a:cxn>
+                <a:cxn ang="0">
+                  <a:pos x="connsiteX6" y="connsiteY6"/>
+                </a:cxn>
+              </a:cxnLst>
+              <a:rect l="l" t="t" r="r" b="b"/>
+              <a:pathLst>
+                <a:path w="252260" h="168173">
+                  <a:moveTo>
+                    <a:pt x="168173" y="168172"/>
+                  </a:moveTo>
+                  <a:lnTo>
+                    <a:pt x="84087" y="168172"/>
+                  </a:lnTo>
+                  <a:cubicBezTo>
+                    <a:pt x="37671" y="168172"/>
+                    <a:pt x="0" y="130587"/>
+                    <a:pt x="0" y="84086"/>
+                  </a:cubicBezTo>
+                  <a:cubicBezTo>
+                    <a:pt x="0" y="37585"/>
+                    <a:pt x="37671" y="-1"/>
+                    <a:pt x="84087" y="-1"/>
+                  </a:cubicBezTo>
+                  <a:lnTo>
+                    <a:pt x="168173" y="-1"/>
+                  </a:lnTo>
+                  <a:cubicBezTo>
+                    <a:pt x="214589" y="-1"/>
+                    <a:pt x="252260" y="37585"/>
+                    <a:pt x="252260" y="84086"/>
+                  </a:cubicBezTo>
+                  <a:cubicBezTo>
+                    <a:pt x="252260" y="130587"/>
+                    <a:pt x="214589" y="168172"/>
+                    <a:pt x="168173" y="168172"/>
+                  </a:cubicBezTo>
+                </a:path>
+              </a:pathLst>
+            </a:custGeom>
+            <a:solidFill>
+              <a:schemeClr val="bg2">
+                <a:lumMod val="90000"/>
+              </a:schemeClr>
+            </a:solidFill>
+            <a:ln w="9525" cap="flat">
+              <a:noFill/>
+              <a:prstDash val="solid"/>
+              <a:miter/>
+            </a:ln>
+          </p:spPr>
+          <p:txBody>
+            <a:bodyPr rtlCol="0" anchor="ctr"/>
+            <a:lstStyle/>
+            <a:p>
+              <a:endParaRPr lang="fr-FR">
+                <a:latin typeface="+mj-lt"/>
+              </a:endParaRPr>
+            </a:p>
+          </p:txBody>
+        </p:sp>
+        <p:sp>
+          <p:nvSpPr>
+            <p:cNvPr id="53" name="Forme libre : forme 52">
+              <a:extLst>
+                <a:ext uri="{FF2B5EF4-FFF2-40B4-BE49-F238E27FC236}">
+                  <a16:creationId xmlns:a16="http://schemas.microsoft.com/office/drawing/2014/main" id="{98530030-869F-48FA-A2B7-E06A1D35F1E1}"/>
+                </a:ext>
+              </a:extLst>
+            </p:cNvPr>
+            <p:cNvSpPr/>
+            <p:nvPr/>
+          </p:nvSpPr>
+          <p:spPr>
+            <a:xfrm>
+              <a:off x="7239540" y="3377124"/>
+              <a:ext cx="944519" cy="655446"/>
+            </a:xfrm>
+            <a:custGeom>
+              <a:avLst/>
+              <a:gdLst>
+                <a:gd name="connsiteX0" fmla="*/ 0 w 336327"/>
+                <a:gd name="connsiteY0" fmla="*/ 672664 h 672665"/>
+                <a:gd name="connsiteX1" fmla="*/ 336328 w 336327"/>
+                <a:gd name="connsiteY1" fmla="*/ 672664 h 672665"/>
+                <a:gd name="connsiteX2" fmla="*/ 336328 w 336327"/>
+                <a:gd name="connsiteY2" fmla="*/ -1 h 672665"/>
+                <a:gd name="connsiteX3" fmla="*/ 0 w 336327"/>
+                <a:gd name="connsiteY3" fmla="*/ -1 h 672665"/>
+              </a:gdLst>
+              <a:ahLst/>
+              <a:cxnLst>
+                <a:cxn ang="0">
+                  <a:pos x="connsiteX0" y="connsiteY0"/>
+                </a:cxn>
+                <a:cxn ang="0">
+                  <a:pos x="connsiteX1" y="connsiteY1"/>
+                </a:cxn>
+                <a:cxn ang="0">
+                  <a:pos x="connsiteX2" y="connsiteY2"/>
+                </a:cxn>
+                <a:cxn ang="0">
+                  <a:pos x="connsiteX3" y="connsiteY3"/>
+                </a:cxn>
+              </a:cxnLst>
+              <a:rect l="l" t="t" r="r" b="b"/>
+              <a:pathLst>
+                <a:path w="336327" h="672665">
+                  <a:moveTo>
+                    <a:pt x="0" y="672664"/>
+                  </a:moveTo>
+                  <a:lnTo>
+                    <a:pt x="336328" y="672664"/>
+                  </a:lnTo>
+                  <a:lnTo>
+                    <a:pt x="336328" y="-1"/>
+                  </a:lnTo>
+                  <a:lnTo>
+                    <a:pt x="0" y="-1"/>
+                  </a:lnTo>
+                  <a:close/>
+                </a:path>
+              </a:pathLst>
+            </a:custGeom>
+            <a:solidFill>
+              <a:srgbClr val="FFFF00"/>
+            </a:solidFill>
+            <a:ln w="9525" cap="flat">
+              <a:noFill/>
+              <a:prstDash val="solid"/>
+              <a:miter/>
+            </a:ln>
+          </p:spPr>
+          <p:txBody>
+            <a:bodyPr rot="0" spcFirstLastPara="0" vertOverflow="overflow" horzOverflow="overflow" vert="horz" wrap="square" lIns="91440" tIns="45720" rIns="91440" bIns="45720" numCol="1" spcCol="0" rtlCol="0" fromWordArt="0" anchor="ctr" anchorCtr="0" forceAA="0" compatLnSpc="1">
+              <a:prstTxWarp prst="textNoShape">
+                <a:avLst/>
+              </a:prstTxWarp>
+              <a:noAutofit/>
+            </a:bodyPr>
+            <a:lstStyle/>
+            <a:p>
+              <a:endParaRPr lang="fr-FR">
+                <a:latin typeface="+mj-lt"/>
+              </a:endParaRPr>
+            </a:p>
+          </p:txBody>
+        </p:sp>
+        <p:sp>
+          <p:nvSpPr>
+            <p:cNvPr id="54" name="Forme libre : forme 53">
+              <a:extLst>
+                <a:ext uri="{FF2B5EF4-FFF2-40B4-BE49-F238E27FC236}">
+                  <a16:creationId xmlns:a16="http://schemas.microsoft.com/office/drawing/2014/main" id="{8B2FB57D-55DB-49B1-829D-49035CE9B419}"/>
+                </a:ext>
+              </a:extLst>
+            </p:cNvPr>
+            <p:cNvSpPr/>
+            <p:nvPr/>
+          </p:nvSpPr>
+          <p:spPr>
+            <a:xfrm>
+              <a:off x="7231741" y="4170422"/>
+              <a:ext cx="944519" cy="655446"/>
+            </a:xfrm>
+            <a:custGeom>
+              <a:avLst/>
+              <a:gdLst>
+                <a:gd name="connsiteX0" fmla="*/ 0 w 336327"/>
+                <a:gd name="connsiteY0" fmla="*/ 672664 h 672665"/>
+                <a:gd name="connsiteX1" fmla="*/ 336328 w 336327"/>
+                <a:gd name="connsiteY1" fmla="*/ 672664 h 672665"/>
+                <a:gd name="connsiteX2" fmla="*/ 336328 w 336327"/>
+                <a:gd name="connsiteY2" fmla="*/ -1 h 672665"/>
+                <a:gd name="connsiteX3" fmla="*/ 0 w 336327"/>
+                <a:gd name="connsiteY3" fmla="*/ -1 h 672665"/>
+              </a:gdLst>
+              <a:ahLst/>
+              <a:cxnLst>
+                <a:cxn ang="0">
+                  <a:pos x="connsiteX0" y="connsiteY0"/>
+                </a:cxn>
+                <a:cxn ang="0">
+                  <a:pos x="connsiteX1" y="connsiteY1"/>
+                </a:cxn>
+                <a:cxn ang="0">
+                  <a:pos x="connsiteX2" y="connsiteY2"/>
+                </a:cxn>
+                <a:cxn ang="0">
+                  <a:pos x="connsiteX3" y="connsiteY3"/>
+                </a:cxn>
+              </a:cxnLst>
+              <a:rect l="l" t="t" r="r" b="b"/>
+              <a:pathLst>
+                <a:path w="336327" h="672665">
+                  <a:moveTo>
+                    <a:pt x="0" y="672664"/>
+                  </a:moveTo>
+                  <a:lnTo>
+                    <a:pt x="336328" y="672664"/>
+                  </a:lnTo>
+                  <a:lnTo>
+                    <a:pt x="336328" y="-1"/>
+                  </a:lnTo>
+                  <a:lnTo>
+                    <a:pt x="0" y="-1"/>
+                  </a:lnTo>
+                  <a:close/>
+                </a:path>
+              </a:pathLst>
+            </a:custGeom>
+            <a:solidFill>
+              <a:srgbClr val="92D050"/>
+            </a:solidFill>
+            <a:ln w="9525" cap="flat">
+              <a:noFill/>
+              <a:prstDash val="solid"/>
+              <a:miter/>
+            </a:ln>
+          </p:spPr>
+          <p:txBody>
+            <a:bodyPr rot="0" spcFirstLastPara="0" vertOverflow="overflow" horzOverflow="overflow" vert="horz" wrap="square" lIns="91440" tIns="45720" rIns="91440" bIns="45720" numCol="1" spcCol="0" rtlCol="0" fromWordArt="0" anchor="ctr" anchorCtr="0" forceAA="0" compatLnSpc="1">
+              <a:prstTxWarp prst="textNoShape">
+                <a:avLst/>
+              </a:prstTxWarp>
+              <a:noAutofit/>
+            </a:bodyPr>
+            <a:lstStyle/>
+            <a:p>
+              <a:endParaRPr lang="fr-FR">
+                <a:latin typeface="+mj-lt"/>
+              </a:endParaRPr>
+            </a:p>
+          </p:txBody>
+        </p:sp>
+      </p:grpSp>
+      <p:sp>
+        <p:nvSpPr>
+          <p:cNvPr id="22" name="ZoneTexte 21">
+            <a:extLst>
+              <a:ext uri="{FF2B5EF4-FFF2-40B4-BE49-F238E27FC236}">
+                <a16:creationId xmlns:a16="http://schemas.microsoft.com/office/drawing/2014/main" id="{60578300-98D6-402D-A7AE-50426EEB9D6B}"/>
               </a:ext>
             </a:extLst>
           </p:cNvPr>
@@ -9570,67 +11303,62 @@
       </p:sp>
       <p:sp>
         <p:nvSpPr>
-          <p:cNvPr id="5" name="Rectangle 4">
-            <a:extLst>
-              <a:ext uri="{FF2B5EF4-FFF2-40B4-BE49-F238E27FC236}">
-                <a16:creationId xmlns:a16="http://schemas.microsoft.com/office/drawing/2014/main" id="{343289F4-481E-4252-8108-EE24546E188C}"/>
-              </a:ext>
-            </a:extLst>
-          </p:cNvPr>
-          <p:cNvSpPr/>
-          <p:nvPr/>
+          <p:cNvPr id="25" name="Titre 1">
+            <a:extLst>
+              <a:ext uri="{FF2B5EF4-FFF2-40B4-BE49-F238E27FC236}">
+                <a16:creationId xmlns:a16="http://schemas.microsoft.com/office/drawing/2014/main" id="{F2291A2D-A53C-4328-9D5C-773241204907}"/>
+              </a:ext>
+            </a:extLst>
+          </p:cNvPr>
+          <p:cNvSpPr>
+            <a:spLocks noGrp="1"/>
+          </p:cNvSpPr>
+          <p:nvPr>
+            <p:ph type="title"/>
+          </p:nvPr>
         </p:nvSpPr>
         <p:spPr>
           <a:xfrm>
-            <a:off x="6324600" y="4239764"/>
-            <a:ext cx="5029200" cy="914400"/>
+            <a:off x="1039824" y="3125456"/>
+            <a:ext cx="5898931" cy="824908"/>
           </a:xfrm>
-          <a:prstGeom prst="rect">
-            <a:avLst/>
-          </a:prstGeom>
-          <a:solidFill>
-            <a:srgbClr val="43B6C5">
-              <a:alpha val="63137"/>
-            </a:srgbClr>
-          </a:solidFill>
-          <a:ln>
-            <a:noFill/>
-          </a:ln>
         </p:spPr>
-        <p:style>
-          <a:lnRef idx="2">
-            <a:schemeClr val="accent1">
-              <a:shade val="50000"/>
-            </a:schemeClr>
-          </a:lnRef>
-          <a:fillRef idx="1">
-            <a:schemeClr val="accent1"/>
-          </a:fillRef>
-          <a:effectRef idx="0">
-            <a:schemeClr val="accent1"/>
-          </a:effectRef>
-          <a:fontRef idx="minor">
-            <a:schemeClr val="lt1"/>
-          </a:fontRef>
-        </p:style>
-        <p:txBody>
-          <a:bodyPr rtlCol="0" anchor="ctr"/>
+        <p:txBody>
+          <a:bodyPr>
+            <a:normAutofit fontScale="90000"/>
+          </a:bodyPr>
           <a:lstStyle/>
           <a:p>
             <a:pPr algn="ctr"/>
-            <a:endParaRPr lang="fr-FR" dirty="0">
-              <a:latin typeface="Roboto Light" panose="02000000000000000000" pitchFamily="2" charset="0"/>
-              <a:ea typeface="Roboto Light" panose="02000000000000000000" pitchFamily="2" charset="0"/>
-            </a:endParaRPr>
-          </a:p>
-        </p:txBody>
-      </p:sp>
-      <p:sp>
-        <p:nvSpPr>
-          <p:cNvPr id="6" name="ZoneTexte 5">
-            <a:extLst>
-              <a:ext uri="{FF2B5EF4-FFF2-40B4-BE49-F238E27FC236}">
-                <a16:creationId xmlns:a16="http://schemas.microsoft.com/office/drawing/2014/main" id="{A28EACEE-3A33-49DF-AE0A-4B57D2F03E3C}"/>
+            <a:r>
+              <a:rPr lang="fr-FR" sz="3200" dirty="0">
+                <a:latin typeface="Roboto Light" panose="02000000000000000000" pitchFamily="2" charset="0"/>
+                <a:ea typeface="Roboto Light" panose="02000000000000000000" pitchFamily="2" charset="0"/>
+              </a:rPr>
+              <a:t>Code confidentiel incorrect.</a:t>
+            </a:r>
+            <a:br>
+              <a:rPr lang="fr-FR" sz="3200" dirty="0">
+                <a:latin typeface="Roboto Light" panose="02000000000000000000" pitchFamily="2" charset="0"/>
+                <a:ea typeface="Roboto Light" panose="02000000000000000000" pitchFamily="2" charset="0"/>
+              </a:rPr>
+            </a:br>
+            <a:r>
+              <a:rPr lang="fr-FR" sz="3200" dirty="0">
+                <a:latin typeface="Roboto Light" panose="02000000000000000000" pitchFamily="2" charset="0"/>
+                <a:ea typeface="Roboto Light" panose="02000000000000000000" pitchFamily="2" charset="0"/>
+              </a:rPr>
+              <a:t>Réessayer :</a:t>
+            </a:r>
+          </a:p>
+        </p:txBody>
+      </p:sp>
+      <p:sp>
+        <p:nvSpPr>
+          <p:cNvPr id="27" name="ZoneTexte 26">
+            <a:extLst>
+              <a:ext uri="{FF2B5EF4-FFF2-40B4-BE49-F238E27FC236}">
+                <a16:creationId xmlns:a16="http://schemas.microsoft.com/office/drawing/2014/main" id="{F1206EEA-BB6F-4BAB-8297-1143D0C88CDD}"/>
               </a:ext>
             </a:extLst>
           </p:cNvPr>
@@ -9639,8 +11367,8 @@
         </p:nvSpPr>
         <p:spPr>
           <a:xfrm>
-            <a:off x="9069200" y="4377904"/>
-            <a:ext cx="2284600" cy="646331"/>
+            <a:off x="853263" y="5877641"/>
+            <a:ext cx="2758257" cy="400110"/>
           </a:xfrm>
           <a:prstGeom prst="rect">
             <a:avLst/>
@@ -9648,51 +11376,13 @@
           <a:noFill/>
         </p:spPr>
         <p:txBody>
-          <a:bodyPr wrap="none" rtlCol="0">
-            <a:spAutoFit/>
-          </a:bodyPr>
-          <a:lstStyle/>
-          <a:p>
-            <a:r>
-              <a:rPr lang="fr-FR" sz="3600" dirty="0">
-                <a:latin typeface="Roboto Light" panose="02000000000000000000" pitchFamily="2" charset="0"/>
-                <a:ea typeface="Roboto Light" panose="02000000000000000000" pitchFamily="2" charset="0"/>
-              </a:rPr>
-              <a:t>Réessayer</a:t>
-            </a:r>
-          </a:p>
-        </p:txBody>
-      </p:sp>
-      <p:sp>
-        <p:nvSpPr>
-          <p:cNvPr id="8" name="ZoneTexte 7">
-            <a:extLst>
-              <a:ext uri="{FF2B5EF4-FFF2-40B4-BE49-F238E27FC236}">
-                <a16:creationId xmlns:a16="http://schemas.microsoft.com/office/drawing/2014/main" id="{53BF5934-DC52-4C8E-BCFB-64F704114C08}"/>
-              </a:ext>
-            </a:extLst>
-          </p:cNvPr>
-          <p:cNvSpPr txBox="1"/>
-          <p:nvPr/>
-        </p:nvSpPr>
-        <p:spPr>
-          <a:xfrm>
-            <a:off x="3936833" y="3136612"/>
-            <a:ext cx="4318334" cy="584775"/>
-          </a:xfrm>
-          <a:prstGeom prst="rect">
-            <a:avLst/>
-          </a:prstGeom>
-          <a:noFill/>
-        </p:spPr>
-        <p:txBody>
           <a:bodyPr wrap="square">
             <a:spAutoFit/>
           </a:bodyPr>
           <a:lstStyle/>
           <a:p>
             <a:r>
-              <a:rPr lang="fr-FR" sz="3200" dirty="0">
+              <a:rPr lang="fr-FR" sz="2000" dirty="0">
                 <a:latin typeface="Roboto Light" panose="02000000000000000000" pitchFamily="2" charset="0"/>
                 <a:ea typeface="Roboto Light" panose="02000000000000000000" pitchFamily="2" charset="0"/>
               </a:rPr>
@@ -9701,12 +11391,51 @@
           </a:p>
         </p:txBody>
       </p:sp>
-      <p:sp>
-        <p:nvSpPr>
-          <p:cNvPr id="9" name="Rectangle 8">
-            <a:extLst>
-              <a:ext uri="{FF2B5EF4-FFF2-40B4-BE49-F238E27FC236}">
-                <a16:creationId xmlns:a16="http://schemas.microsoft.com/office/drawing/2014/main" id="{B1A94FFE-AFC2-411A-B380-7E134FBEAC8D}"/>
+      <p:pic>
+        <p:nvPicPr>
+          <p:cNvPr id="28" name="Graphique 27" descr="Badge croix avec un remplissage uni">
+            <a:extLst>
+              <a:ext uri="{FF2B5EF4-FFF2-40B4-BE49-F238E27FC236}">
+                <a16:creationId xmlns:a16="http://schemas.microsoft.com/office/drawing/2014/main" id="{FD979C4E-934F-46E6-BCEF-C529B263507B}"/>
+              </a:ext>
+            </a:extLst>
+          </p:cNvPr>
+          <p:cNvPicPr>
+            <a:picLocks noChangeAspect="1"/>
+          </p:cNvPicPr>
+          <p:nvPr/>
+        </p:nvPicPr>
+        <p:blipFill>
+          <a:blip r:embed="rId2">
+            <a:extLst>
+              <a:ext uri="{28A0092B-C50C-407E-A947-70E740481C1C}">
+                <a14:useLocalDpi xmlns:a14="http://schemas.microsoft.com/office/drawing/2010/main" val="0"/>
+              </a:ext>
+              <a:ext uri="{96DAC541-7B7A-43D3-8B79-37D633B846F1}">
+                <asvg:svgBlip xmlns:asvg="http://schemas.microsoft.com/office/drawing/2016/SVG/main" r:embed="rId3"/>
+              </a:ext>
+            </a:extLst>
+          </a:blip>
+          <a:stretch>
+            <a:fillRect/>
+          </a:stretch>
+        </p:blipFill>
+        <p:spPr>
+          <a:xfrm>
+            <a:off x="5253245" y="861081"/>
+            <a:ext cx="1685510" cy="1685510"/>
+          </a:xfrm>
+          <a:prstGeom prst="rect">
+            <a:avLst/>
+          </a:prstGeom>
+        </p:spPr>
+      </p:pic>
+      <p:sp>
+        <p:nvSpPr>
+          <p:cNvPr id="29" name="Rectangle 28">
+            <a:extLst>
+              <a:ext uri="{FF2B5EF4-FFF2-40B4-BE49-F238E27FC236}">
+                <a16:creationId xmlns:a16="http://schemas.microsoft.com/office/drawing/2014/main" id="{E74B2B09-5067-4668-B62A-B82E223AFCA8}"/>
               </a:ext>
             </a:extLst>
           </p:cNvPr>
@@ -9760,10 +11489,10 @@
       </p:sp>
       <p:sp>
         <p:nvSpPr>
-          <p:cNvPr id="10" name="ZoneTexte 9">
-            <a:extLst>
-              <a:ext uri="{FF2B5EF4-FFF2-40B4-BE49-F238E27FC236}">
-                <a16:creationId xmlns:a16="http://schemas.microsoft.com/office/drawing/2014/main" id="{4794C163-9EA9-410F-BED2-FD49C035A7CB}"/>
+          <p:cNvPr id="30" name="ZoneTexte 29">
+            <a:extLst>
+              <a:ext uri="{FF2B5EF4-FFF2-40B4-BE49-F238E27FC236}">
+                <a16:creationId xmlns:a16="http://schemas.microsoft.com/office/drawing/2014/main" id="{6C67E79B-C2D4-4EB5-ACEE-3962778E27C5}"/>
               </a:ext>
             </a:extLst>
           </p:cNvPr>
@@ -9799,49 +11528,10 @@
           </a:p>
         </p:txBody>
       </p:sp>
-      <p:pic>
-        <p:nvPicPr>
-          <p:cNvPr id="12" name="Graphique 11" descr="Badge croix avec un remplissage uni">
-            <a:extLst>
-              <a:ext uri="{FF2B5EF4-FFF2-40B4-BE49-F238E27FC236}">
-                <a16:creationId xmlns:a16="http://schemas.microsoft.com/office/drawing/2014/main" id="{173C89F5-5DBA-429A-B897-4D74DC2B5DB7}"/>
-              </a:ext>
-            </a:extLst>
-          </p:cNvPr>
-          <p:cNvPicPr>
-            <a:picLocks noChangeAspect="1"/>
-          </p:cNvPicPr>
-          <p:nvPr/>
-        </p:nvPicPr>
-        <p:blipFill>
-          <a:blip r:embed="rId2">
-            <a:extLst>
-              <a:ext uri="{28A0092B-C50C-407E-A947-70E740481C1C}">
-                <a14:useLocalDpi xmlns:a14="http://schemas.microsoft.com/office/drawing/2010/main" val="0"/>
-              </a:ext>
-              <a:ext uri="{96DAC541-7B7A-43D3-8B79-37D633B846F1}">
-                <asvg:svgBlip xmlns:asvg="http://schemas.microsoft.com/office/drawing/2016/SVG/main" r:embed="rId3"/>
-              </a:ext>
-            </a:extLst>
-          </a:blip>
-          <a:stretch>
-            <a:fillRect/>
-          </a:stretch>
-        </p:blipFill>
-        <p:spPr>
-          <a:xfrm>
-            <a:off x="5253245" y="861081"/>
-            <a:ext cx="1685510" cy="1685510"/>
-          </a:xfrm>
-          <a:prstGeom prst="rect">
-            <a:avLst/>
-          </a:prstGeom>
-        </p:spPr>
-      </p:pic>
     </p:spTree>
     <p:extLst>
       <p:ext uri="{BB962C8B-B14F-4D97-AF65-F5344CB8AC3E}">
-        <p14:creationId xmlns:p14="http://schemas.microsoft.com/office/powerpoint/2010/main" val="4083629247"/>
+        <p14:creationId xmlns:p14="http://schemas.microsoft.com/office/powerpoint/2010/main" val="2792927632"/>
       </p:ext>
     </p:extLst>
   </p:cSld>
@@ -9917,7 +11607,8 @@
           <a:p>
             <a:pPr algn="ctr"/>
             <a:endParaRPr lang="fr-FR">
-              <a:latin typeface="+mj-lt"/>
+              <a:latin typeface="Roboto Light" panose="02000000000000000000" pitchFamily="2" charset="0"/>
+              <a:ea typeface="Roboto Light" panose="02000000000000000000" pitchFamily="2" charset="0"/>
             </a:endParaRPr>
           </a:p>
         </p:txBody>
@@ -9952,27 +11643,78 @@
           <a:p>
             <a:pPr algn="ctr"/>
             <a:r>
-              <a:rPr lang="fr-FR" sz="4400" i="1" dirty="0"/>
+              <a:rPr lang="fr-FR" sz="4400" i="1" dirty="0">
+                <a:latin typeface="Roboto Light" panose="02000000000000000000" pitchFamily="2" charset="0"/>
+                <a:ea typeface="Roboto Light" panose="02000000000000000000" pitchFamily="2" charset="0"/>
+              </a:rPr>
               <a:t>Votre carte a été confisquée.</a:t>
             </a:r>
             <a:br>
-              <a:rPr lang="fr-FR" sz="4400" i="1" dirty="0"/>
+              <a:rPr lang="fr-FR" sz="4400" i="1" dirty="0">
+                <a:latin typeface="Roboto Light" panose="02000000000000000000" pitchFamily="2" charset="0"/>
+                <a:ea typeface="Roboto Light" panose="02000000000000000000" pitchFamily="2" charset="0"/>
+              </a:rPr>
             </a:br>
             <a:r>
-              <a:rPr lang="fr-FR" sz="4400" i="1" dirty="0"/>
+              <a:rPr lang="fr-FR" sz="3600" i="1" dirty="0">
+                <a:solidFill>
+                  <a:schemeClr val="tx1">
+                    <a:lumMod val="50000"/>
+                    <a:lumOff val="50000"/>
+                  </a:schemeClr>
+                </a:solidFill>
+                <a:latin typeface="Roboto Light" panose="02000000000000000000" pitchFamily="2" charset="0"/>
+                <a:ea typeface="Roboto Light" panose="02000000000000000000" pitchFamily="2" charset="0"/>
+              </a:rPr>
               <a:t>** message personnalisé : raison **</a:t>
             </a:r>
             <a:br>
-              <a:rPr lang="fr-FR" sz="4400" i="1" dirty="0"/>
+              <a:rPr lang="fr-FR" sz="3600" i="1" dirty="0">
+                <a:solidFill>
+                  <a:schemeClr val="tx1">
+                    <a:lumMod val="50000"/>
+                    <a:lumOff val="50000"/>
+                  </a:schemeClr>
+                </a:solidFill>
+                <a:latin typeface="Roboto Light" panose="02000000000000000000" pitchFamily="2" charset="0"/>
+                <a:ea typeface="Roboto Light" panose="02000000000000000000" pitchFamily="2" charset="0"/>
+              </a:rPr>
             </a:br>
             <a:r>
-              <a:rPr lang="fr-FR" sz="4400" i="1" dirty="0"/>
+              <a:rPr lang="fr-FR" sz="3600" i="1" dirty="0">
+                <a:solidFill>
+                  <a:schemeClr val="tx1">
+                    <a:lumMod val="50000"/>
+                    <a:lumOff val="50000"/>
+                  </a:schemeClr>
+                </a:solidFill>
+                <a:latin typeface="Roboto Light" panose="02000000000000000000" pitchFamily="2" charset="0"/>
+                <a:ea typeface="Roboto Light" panose="02000000000000000000" pitchFamily="2" charset="0"/>
+              </a:rPr>
               <a:t>Veuillez contacter votre banque.</a:t>
             </a:r>
             <a:br>
-              <a:rPr lang="fr-FR" dirty="0"/>
+              <a:rPr lang="fr-FR" sz="4000" dirty="0">
+                <a:solidFill>
+                  <a:schemeClr val="tx1">
+                    <a:lumMod val="50000"/>
+                    <a:lumOff val="50000"/>
+                  </a:schemeClr>
+                </a:solidFill>
+                <a:latin typeface="Roboto Light" panose="02000000000000000000" pitchFamily="2" charset="0"/>
+                <a:ea typeface="Roboto Light" panose="02000000000000000000" pitchFamily="2" charset="0"/>
+              </a:rPr>
             </a:br>
-            <a:endParaRPr lang="fr-FR" i="1" dirty="0"/>
+            <a:endParaRPr lang="fr-FR" i="1" dirty="0">
+              <a:solidFill>
+                <a:schemeClr val="tx1">
+                  <a:lumMod val="50000"/>
+                  <a:lumOff val="50000"/>
+                </a:schemeClr>
+              </a:solidFill>
+              <a:latin typeface="Roboto Light" panose="02000000000000000000" pitchFamily="2" charset="0"/>
+              <a:ea typeface="Roboto Light" panose="02000000000000000000" pitchFamily="2" charset="0"/>
+            </a:endParaRPr>
           </a:p>
         </p:txBody>
       </p:sp>
@@ -9991,7 +11733,7 @@
         <p:spPr>
           <a:xfrm>
             <a:off x="705853" y="63987"/>
-            <a:ext cx="2543581" cy="369332"/>
+            <a:ext cx="2781531" cy="369332"/>
           </a:xfrm>
           <a:prstGeom prst="rect">
             <a:avLst/>
@@ -10006,7 +11748,8 @@
           <a:p>
             <a:r>
               <a:rPr lang="fr-FR" dirty="0">
-                <a:latin typeface="+mj-lt"/>
+                <a:latin typeface="Roboto Light" panose="02000000000000000000" pitchFamily="2" charset="0"/>
+                <a:ea typeface="Roboto Light" panose="02000000000000000000" pitchFamily="2" charset="0"/>
               </a:rPr>
               <a:t>Ecran : Carte confisquée*</a:t>
             </a:r>
@@ -10064,7 +11807,8 @@
           <a:p>
             <a:pPr algn="ctr"/>
             <a:endParaRPr lang="fr-FR" dirty="0">
-              <a:latin typeface="+mj-lt"/>
+              <a:latin typeface="Roboto Light" panose="02000000000000000000" pitchFamily="2" charset="0"/>
+              <a:ea typeface="Roboto Light" panose="02000000000000000000" pitchFamily="2" charset="0"/>
             </a:endParaRPr>
           </a:p>
         </p:txBody>
@@ -10084,7 +11828,7 @@
         <p:spPr>
           <a:xfrm>
             <a:off x="10455387" y="5490140"/>
-            <a:ext cx="731290" cy="646331"/>
+            <a:ext cx="792205" cy="646331"/>
           </a:xfrm>
           <a:prstGeom prst="rect">
             <a:avLst/>
@@ -10102,7 +11846,8 @@
                 <a:solidFill>
                   <a:schemeClr val="bg1"/>
                 </a:solidFill>
-                <a:latin typeface="+mj-lt"/>
+                <a:latin typeface="Roboto Light" panose="02000000000000000000" pitchFamily="2" charset="0"/>
+                <a:ea typeface="Roboto Light" panose="02000000000000000000" pitchFamily="2" charset="0"/>
               </a:rPr>
               <a:t>OK</a:t>
             </a:r>
@@ -10162,8 +11907,8 @@
         </p:nvSpPr>
         <p:spPr>
           <a:xfrm>
-            <a:off x="8062087" y="6476031"/>
-            <a:ext cx="4129913" cy="369332"/>
+            <a:off x="7736934" y="6476031"/>
+            <a:ext cx="4455066" cy="369332"/>
           </a:xfrm>
           <a:prstGeom prst="rect">
             <a:avLst/>
@@ -10178,7 +11923,8 @@
           <a:p>
             <a:r>
               <a:rPr lang="fr-FR" dirty="0">
-                <a:latin typeface="+mj-lt"/>
+                <a:latin typeface="Roboto Light" panose="02000000000000000000" pitchFamily="2" charset="0"/>
+                <a:ea typeface="Roboto Light" panose="02000000000000000000" pitchFamily="2" charset="0"/>
               </a:rPr>
               <a:t>* Code incorrect x3, carte déclarée volée…</a:t>
             </a:r>

</xml_diff>

<commit_message>
UP _ exo GAB update à corriger
</commit_message>
<xml_diff>
--- a/FOAD_Unified_Process/GAB/maquettage et diagramme de navigabilité_GAB_retirer de l'argent dont s'identifier.pptx
+++ b/FOAD_Unified_Process/GAB/maquettage et diagramme de navigabilité_GAB_retirer de l'argent dont s'identifier.pptx
@@ -5,7 +5,7 @@
     <p:sldMasterId id="2147483648" r:id="rId1"/>
   </p:sldMasterIdLst>
   <p:notesMasterIdLst>
-    <p:notesMasterId r:id="rId21"/>
+    <p:notesMasterId r:id="rId18"/>
   </p:notesMasterIdLst>
   <p:sldIdLst>
     <p:sldId id="256" r:id="rId2"/>
@@ -23,10 +23,7 @@
     <p:sldId id="270" r:id="rId14"/>
     <p:sldId id="271" r:id="rId15"/>
     <p:sldId id="280" r:id="rId16"/>
-    <p:sldId id="272" r:id="rId17"/>
-    <p:sldId id="273" r:id="rId18"/>
-    <p:sldId id="274" r:id="rId19"/>
-    <p:sldId id="275" r:id="rId20"/>
+    <p:sldId id="273" r:id="rId17"/>
   </p:sldIdLst>
   <p:sldSz cx="12192000" cy="6858000"/>
   <p:notesSz cx="6858000" cy="9144000"/>
@@ -4317,7 +4314,7 @@
                 <a:latin typeface="Roboto" panose="02000000000000000000" pitchFamily="2" charset="0"/>
                 <a:ea typeface="Roboto" panose="02000000000000000000" pitchFamily="2" charset="0"/>
               </a:rPr>
-              <a:t>Maquettage et diagramme de navigabilité </a:t>
+              <a:t>Maquettage</a:t>
             </a:r>
             <a:br>
               <a:rPr lang="fr-FR" sz="6600" dirty="0">
@@ -4715,7 +4712,7 @@
         <p:spPr>
           <a:xfrm>
             <a:off x="705853" y="63987"/>
-            <a:ext cx="3139001" cy="369332"/>
+            <a:ext cx="4213013" cy="369332"/>
           </a:xfrm>
           <a:prstGeom prst="rect">
             <a:avLst/>
@@ -4733,7 +4730,7 @@
                 <a:latin typeface="Roboto Light" panose="02000000000000000000" pitchFamily="2" charset="0"/>
                 <a:ea typeface="Roboto Light" panose="02000000000000000000" pitchFamily="2" charset="0"/>
               </a:rPr>
-              <a:t>Ecran : Montant indisponible*</a:t>
+              <a:t>Ecran : Liquidités du GAB insuffisantes</a:t>
             </a:r>
           </a:p>
         </p:txBody>
@@ -4970,44 +4967,6 @@
           </a:prstGeom>
         </p:spPr>
       </p:pic>
-      <p:sp>
-        <p:nvSpPr>
-          <p:cNvPr id="14" name="ZoneTexte 13">
-            <a:extLst>
-              <a:ext uri="{FF2B5EF4-FFF2-40B4-BE49-F238E27FC236}">
-                <a16:creationId xmlns:a16="http://schemas.microsoft.com/office/drawing/2014/main" id="{148D95E8-D262-4208-B18C-EAABA6EC17EA}"/>
-              </a:ext>
-            </a:extLst>
-          </p:cNvPr>
-          <p:cNvSpPr txBox="1"/>
-          <p:nvPr/>
-        </p:nvSpPr>
-        <p:spPr>
-          <a:xfrm>
-            <a:off x="6433692" y="6459390"/>
-            <a:ext cx="5758308" cy="369332"/>
-          </a:xfrm>
-          <a:prstGeom prst="rect">
-            <a:avLst/>
-          </a:prstGeom>
-          <a:noFill/>
-        </p:spPr>
-        <p:txBody>
-          <a:bodyPr wrap="none" rtlCol="0">
-            <a:spAutoFit/>
-          </a:bodyPr>
-          <a:lstStyle/>
-          <a:p>
-            <a:r>
-              <a:rPr lang="fr-FR" dirty="0">
-                <a:latin typeface="Roboto Light" panose="02000000000000000000" pitchFamily="2" charset="0"/>
-                <a:ea typeface="Roboto Light" panose="02000000000000000000" pitchFamily="2" charset="0"/>
-              </a:rPr>
-              <a:t>*liquidités GAB insuffisantes, fonds client insuffisants… </a:t>
-            </a:r>
-          </a:p>
-        </p:txBody>
-      </p:sp>
     </p:spTree>
     <p:extLst>
       <p:ext uri="{BB962C8B-B14F-4D97-AF65-F5344CB8AC3E}">
@@ -5165,7 +5124,7 @@
         <p:spPr>
           <a:xfrm>
             <a:off x="705853" y="63987"/>
-            <a:ext cx="2996333" cy="369332"/>
+            <a:ext cx="4033476" cy="369332"/>
           </a:xfrm>
           <a:prstGeom prst="rect">
             <a:avLst/>
@@ -5183,7 +5142,7 @@
                 <a:latin typeface="Roboto Light" panose="02000000000000000000" pitchFamily="2" charset="0"/>
                 <a:ea typeface="Roboto Light" panose="02000000000000000000" pitchFamily="2" charset="0"/>
               </a:rPr>
-              <a:t>Ecran : Retrait non autorisé*</a:t>
+              <a:t>Ecran : Fonds du compte insuffisants</a:t>
             </a:r>
           </a:p>
         </p:txBody>
@@ -5321,7 +5280,7 @@
                 <a:latin typeface="Roboto Light" panose="02000000000000000000" pitchFamily="2" charset="0"/>
                 <a:ea typeface="Roboto Light" panose="02000000000000000000" pitchFamily="2" charset="0"/>
               </a:rPr>
-              <a:t>Retrait non autorisé</a:t>
+              <a:t>Retrait impossible</a:t>
             </a:r>
             <a:br>
               <a:rPr lang="fr-FR" sz="3600" dirty="0">
@@ -5352,44 +5311,6 @@
               <a:latin typeface="Roboto Light" panose="02000000000000000000" pitchFamily="2" charset="0"/>
               <a:ea typeface="Roboto Light" panose="02000000000000000000" pitchFamily="2" charset="0"/>
             </a:endParaRPr>
-          </a:p>
-        </p:txBody>
-      </p:sp>
-      <p:sp>
-        <p:nvSpPr>
-          <p:cNvPr id="11" name="ZoneTexte 10">
-            <a:extLst>
-              <a:ext uri="{FF2B5EF4-FFF2-40B4-BE49-F238E27FC236}">
-                <a16:creationId xmlns:a16="http://schemas.microsoft.com/office/drawing/2014/main" id="{6CD923BC-3779-43B2-B02C-CC6D8C62ADF3}"/>
-              </a:ext>
-            </a:extLst>
-          </p:cNvPr>
-          <p:cNvSpPr txBox="1"/>
-          <p:nvPr/>
-        </p:nvSpPr>
-        <p:spPr>
-          <a:xfrm>
-            <a:off x="6704600" y="6446132"/>
-            <a:ext cx="5487400" cy="369332"/>
-          </a:xfrm>
-          <a:prstGeom prst="rect">
-            <a:avLst/>
-          </a:prstGeom>
-          <a:noFill/>
-        </p:spPr>
-        <p:txBody>
-          <a:bodyPr wrap="none" rtlCol="0">
-            <a:spAutoFit/>
-          </a:bodyPr>
-          <a:lstStyle/>
-          <a:p>
-            <a:r>
-              <a:rPr lang="fr-FR" dirty="0">
-                <a:latin typeface="Roboto Light" panose="02000000000000000000" pitchFamily="2" charset="0"/>
-                <a:ea typeface="Roboto Light" panose="02000000000000000000" pitchFamily="2" charset="0"/>
-              </a:rPr>
-              <a:t>*plafond de retrait dépassé, découvert non autorisé…</a:t>
-            </a:r>
           </a:p>
         </p:txBody>
       </p:sp>
@@ -6183,7 +6104,7 @@
           <a:lstStyle/>
           <a:p>
             <a:pPr algn="ctr"/>
-            <a:endParaRPr lang="fr-FR">
+            <a:endParaRPr lang="fr-FR" sz="1600">
               <a:latin typeface="Roboto Light" panose="02000000000000000000" pitchFamily="2" charset="0"/>
               <a:ea typeface="Roboto Light" panose="02000000000000000000" pitchFamily="2" charset="0"/>
             </a:endParaRPr>
@@ -6205,7 +6126,7 @@
         <p:spPr>
           <a:xfrm>
             <a:off x="705853" y="63987"/>
-            <a:ext cx="2757486" cy="369332"/>
+            <a:ext cx="1229824" cy="369332"/>
           </a:xfrm>
           <a:prstGeom prst="rect">
             <a:avLst/>
@@ -6223,7 +6144,7 @@
                 <a:latin typeface="Roboto Light" panose="02000000000000000000" pitchFamily="2" charset="0"/>
                 <a:ea typeface="Roboto Light" panose="02000000000000000000" pitchFamily="2" charset="0"/>
               </a:rPr>
-              <a:t>Ecran : Récupération reçu</a:t>
+              <a:t>Ecran : Fin</a:t>
             </a:r>
           </a:p>
         </p:txBody>
@@ -6233,7 +6154,7 @@
           <p:cNvPr id="5" name="Titre 1">
             <a:extLst>
               <a:ext uri="{FF2B5EF4-FFF2-40B4-BE49-F238E27FC236}">
-                <a16:creationId xmlns:a16="http://schemas.microsoft.com/office/drawing/2014/main" id="{3F8741CE-B246-4A19-9209-A4030ECA25FD}"/>
+                <a16:creationId xmlns:a16="http://schemas.microsoft.com/office/drawing/2014/main" id="{D6FB2147-9ED0-492E-AA8C-6B7418F15283}"/>
               </a:ext>
             </a:extLst>
           </p:cNvPr>
@@ -6244,7 +6165,7 @@
         </p:nvSpPr>
         <p:spPr>
           <a:xfrm>
-            <a:off x="1443856" y="706384"/>
+            <a:off x="1443857" y="2681535"/>
             <a:ext cx="9304283" cy="1325563"/>
           </a:xfrm>
           <a:prstGeom prst="rect">
@@ -6281,17 +6202,17 @@
                 <a:latin typeface="Roboto Light" panose="02000000000000000000" pitchFamily="2" charset="0"/>
                 <a:ea typeface="Roboto Light" panose="02000000000000000000" pitchFamily="2" charset="0"/>
               </a:rPr>
-              <a:t>Veuillez récupérer votre reçu</a:t>
+              <a:t>Veuillez retirer votre carte</a:t>
             </a:r>
           </a:p>
         </p:txBody>
       </p:sp>
       <p:pic>
         <p:nvPicPr>
-          <p:cNvPr id="10" name="Graphique 9">
-            <a:extLst>
-              <a:ext uri="{FF2B5EF4-FFF2-40B4-BE49-F238E27FC236}">
-                <a16:creationId xmlns:a16="http://schemas.microsoft.com/office/drawing/2014/main" id="{9A6A7926-1DDF-4445-B194-296ED05860CF}"/>
+          <p:cNvPr id="9" name="Graphique 8">
+            <a:extLst>
+              <a:ext uri="{FF2B5EF4-FFF2-40B4-BE49-F238E27FC236}">
+                <a16:creationId xmlns:a16="http://schemas.microsoft.com/office/drawing/2014/main" id="{2FF17A8E-7523-42D3-8C38-89E9D52BCBF0}"/>
               </a:ext>
             </a:extLst>
           </p:cNvPr>
@@ -6317,325 +6238,20 @@
         </p:blipFill>
         <p:spPr>
           <a:xfrm>
-            <a:off x="4361789" y="2031947"/>
-            <a:ext cx="3468415" cy="3468415"/>
+            <a:off x="5031716" y="4023049"/>
+            <a:ext cx="2128567" cy="2128567"/>
           </a:xfrm>
           <a:prstGeom prst="rect">
             <a:avLst/>
           </a:prstGeom>
         </p:spPr>
       </p:pic>
-    </p:spTree>
-    <p:extLst>
-      <p:ext uri="{BB962C8B-B14F-4D97-AF65-F5344CB8AC3E}">
-        <p14:creationId xmlns:p14="http://schemas.microsoft.com/office/powerpoint/2010/main" val="1273032520"/>
-      </p:ext>
-    </p:extLst>
-  </p:cSld>
-  <p:clrMapOvr>
-    <a:masterClrMapping/>
-  </p:clrMapOvr>
-</p:sld>
-</file>
-
-<file path=ppt/slides/slide17.xml><?xml version="1.0" encoding="utf-8"?>
-<p:sld xmlns:a="http://schemas.openxmlformats.org/drawingml/2006/main" xmlns:r="http://schemas.openxmlformats.org/officeDocument/2006/relationships" xmlns:p="http://schemas.openxmlformats.org/presentationml/2006/main">
-  <p:cSld>
-    <p:spTree>
-      <p:nvGrpSpPr>
-        <p:cNvPr id="1" name=""/>
-        <p:cNvGrpSpPr/>
-        <p:nvPr/>
-      </p:nvGrpSpPr>
-      <p:grpSpPr>
-        <a:xfrm>
-          <a:off x="0" y="0"/>
-          <a:ext cx="0" cy="0"/>
-          <a:chOff x="0" y="0"/>
-          <a:chExt cx="0" cy="0"/>
-        </a:xfrm>
-      </p:grpSpPr>
-      <p:sp>
-        <p:nvSpPr>
-          <p:cNvPr id="3" name="Rectangle 2">
-            <a:extLst>
-              <a:ext uri="{FF2B5EF4-FFF2-40B4-BE49-F238E27FC236}">
-                <a16:creationId xmlns:a16="http://schemas.microsoft.com/office/drawing/2014/main" id="{2E8E3367-571F-486C-80AB-043BF71E1C3E}"/>
-              </a:ext>
-            </a:extLst>
-          </p:cNvPr>
-          <p:cNvSpPr/>
-          <p:nvPr/>
-        </p:nvSpPr>
-        <p:spPr>
-          <a:xfrm>
-            <a:off x="705853" y="465221"/>
-            <a:ext cx="10780295" cy="5927558"/>
-          </a:xfrm>
-          <a:prstGeom prst="rect">
-            <a:avLst/>
-          </a:prstGeom>
-          <a:noFill/>
-          <a:ln w="57150">
-            <a:solidFill>
-              <a:srgbClr val="FFC000"/>
-            </a:solidFill>
-          </a:ln>
-        </p:spPr>
-        <p:style>
-          <a:lnRef idx="2">
-            <a:schemeClr val="accent1">
-              <a:shade val="50000"/>
-            </a:schemeClr>
-          </a:lnRef>
-          <a:fillRef idx="1">
-            <a:schemeClr val="accent1"/>
-          </a:fillRef>
-          <a:effectRef idx="0">
-            <a:schemeClr val="accent1"/>
-          </a:effectRef>
-          <a:fontRef idx="minor">
-            <a:schemeClr val="lt1"/>
-          </a:fontRef>
-        </p:style>
-        <p:txBody>
-          <a:bodyPr rtlCol="0" anchor="ctr"/>
-          <a:lstStyle/>
-          <a:p>
-            <a:pPr algn="ctr"/>
-            <a:endParaRPr lang="fr-FR">
-              <a:latin typeface="Roboto Light" panose="02000000000000000000" pitchFamily="2" charset="0"/>
-              <a:ea typeface="Roboto Light" panose="02000000000000000000" pitchFamily="2" charset="0"/>
-            </a:endParaRPr>
-          </a:p>
-        </p:txBody>
-      </p:sp>
-      <p:sp>
-        <p:nvSpPr>
-          <p:cNvPr id="4" name="ZoneTexte 3">
-            <a:extLst>
-              <a:ext uri="{FF2B5EF4-FFF2-40B4-BE49-F238E27FC236}">
-                <a16:creationId xmlns:a16="http://schemas.microsoft.com/office/drawing/2014/main" id="{5B2C0825-ABD4-4F7B-8EA3-9F95BAA7C9AC}"/>
-              </a:ext>
-            </a:extLst>
-          </p:cNvPr>
-          <p:cNvSpPr txBox="1"/>
-          <p:nvPr/>
-        </p:nvSpPr>
-        <p:spPr>
-          <a:xfrm>
-            <a:off x="705853" y="63987"/>
-            <a:ext cx="2828018" cy="369332"/>
-          </a:xfrm>
-          <a:prstGeom prst="rect">
-            <a:avLst/>
-          </a:prstGeom>
-          <a:noFill/>
-        </p:spPr>
-        <p:txBody>
-          <a:bodyPr wrap="none" rtlCol="0">
-            <a:spAutoFit/>
-          </a:bodyPr>
-          <a:lstStyle/>
-          <a:p>
-            <a:r>
-              <a:rPr lang="fr-FR" dirty="0">
-                <a:latin typeface="Roboto Light" panose="02000000000000000000" pitchFamily="2" charset="0"/>
-                <a:ea typeface="Roboto Light" panose="02000000000000000000" pitchFamily="2" charset="0"/>
-              </a:rPr>
-              <a:t>Ecran : Récupération carte</a:t>
-            </a:r>
-          </a:p>
-        </p:txBody>
-      </p:sp>
-      <p:sp>
-        <p:nvSpPr>
-          <p:cNvPr id="5" name="Titre 1">
-            <a:extLst>
-              <a:ext uri="{FF2B5EF4-FFF2-40B4-BE49-F238E27FC236}">
-                <a16:creationId xmlns:a16="http://schemas.microsoft.com/office/drawing/2014/main" id="{D6FB2147-9ED0-492E-AA8C-6B7418F15283}"/>
-              </a:ext>
-            </a:extLst>
-          </p:cNvPr>
-          <p:cNvSpPr txBox="1">
-            <a:spLocks/>
-          </p:cNvSpPr>
-          <p:nvPr/>
-        </p:nvSpPr>
-        <p:spPr>
-          <a:xfrm>
-            <a:off x="1443856" y="706384"/>
-            <a:ext cx="9304283" cy="1325563"/>
-          </a:xfrm>
-          <a:prstGeom prst="rect">
-            <a:avLst/>
-          </a:prstGeom>
-        </p:spPr>
-        <p:txBody>
-          <a:bodyPr vert="horz" lIns="91440" tIns="45720" rIns="91440" bIns="45720" rtlCol="0" anchor="ctr">
-            <a:normAutofit/>
-          </a:bodyPr>
-          <a:lstStyle>
-            <a:lvl1pPr algn="l" defTabSz="914400" rtl="0" eaLnBrk="1" latinLnBrk="0" hangingPunct="1">
-              <a:lnSpc>
-                <a:spcPct val="90000"/>
-              </a:lnSpc>
-              <a:spcBef>
-                <a:spcPct val="0"/>
-              </a:spcBef>
-              <a:buNone/>
-              <a:defRPr sz="4400" kern="1200">
-                <a:solidFill>
-                  <a:schemeClr val="tx1"/>
-                </a:solidFill>
-                <a:latin typeface="+mj-lt"/>
-                <a:ea typeface="+mj-ea"/>
-                <a:cs typeface="+mj-cs"/>
-              </a:defRPr>
-            </a:lvl1pPr>
-          </a:lstStyle>
-          <a:p>
-            <a:pPr algn="ctr"/>
-            <a:r>
-              <a:rPr lang="fr-FR" dirty="0">
-                <a:latin typeface="Roboto Light" panose="02000000000000000000" pitchFamily="2" charset="0"/>
-                <a:ea typeface="Roboto Light" panose="02000000000000000000" pitchFamily="2" charset="0"/>
-              </a:rPr>
-              <a:t>Veuillez retirer votre carte</a:t>
-            </a:r>
-          </a:p>
-        </p:txBody>
-      </p:sp>
-      <p:pic>
-        <p:nvPicPr>
-          <p:cNvPr id="9" name="Graphique 8">
-            <a:extLst>
-              <a:ext uri="{FF2B5EF4-FFF2-40B4-BE49-F238E27FC236}">
-                <a16:creationId xmlns:a16="http://schemas.microsoft.com/office/drawing/2014/main" id="{2FF17A8E-7523-42D3-8C38-89E9D52BCBF0}"/>
-              </a:ext>
-            </a:extLst>
-          </p:cNvPr>
-          <p:cNvPicPr>
-            <a:picLocks noChangeAspect="1"/>
-          </p:cNvPicPr>
-          <p:nvPr/>
-        </p:nvPicPr>
-        <p:blipFill>
-          <a:blip r:embed="rId2">
-            <a:extLst>
-              <a:ext uri="{28A0092B-C50C-407E-A947-70E740481C1C}">
-                <a14:useLocalDpi xmlns:a14="http://schemas.microsoft.com/office/drawing/2010/main" val="0"/>
-              </a:ext>
-              <a:ext uri="{96DAC541-7B7A-43D3-8B79-37D633B846F1}">
-                <asvg:svgBlip xmlns:asvg="http://schemas.microsoft.com/office/drawing/2016/SVG/main" r:embed="rId3"/>
-              </a:ext>
-            </a:extLst>
-          </a:blip>
-          <a:stretch>
-            <a:fillRect/>
-          </a:stretch>
-        </p:blipFill>
-        <p:spPr>
-          <a:xfrm>
-            <a:off x="4529928" y="2085416"/>
-            <a:ext cx="3132138" cy="3132138"/>
-          </a:xfrm>
-          <a:prstGeom prst="rect">
-            <a:avLst/>
-          </a:prstGeom>
-        </p:spPr>
-      </p:pic>
-    </p:spTree>
-    <p:extLst>
-      <p:ext uri="{BB962C8B-B14F-4D97-AF65-F5344CB8AC3E}">
-        <p14:creationId xmlns:p14="http://schemas.microsoft.com/office/powerpoint/2010/main" val="3275419602"/>
-      </p:ext>
-    </p:extLst>
-  </p:cSld>
-  <p:clrMapOvr>
-    <a:masterClrMapping/>
-  </p:clrMapOvr>
-</p:sld>
-</file>
-
-<file path=ppt/slides/slide18.xml><?xml version="1.0" encoding="utf-8"?>
-<p:sld xmlns:a="http://schemas.openxmlformats.org/drawingml/2006/main" xmlns:r="http://schemas.openxmlformats.org/officeDocument/2006/relationships" xmlns:p="http://schemas.openxmlformats.org/presentationml/2006/main">
-  <p:cSld>
-    <p:spTree>
-      <p:nvGrpSpPr>
-        <p:cNvPr id="1" name=""/>
-        <p:cNvGrpSpPr/>
-        <p:nvPr/>
-      </p:nvGrpSpPr>
-      <p:grpSpPr>
-        <a:xfrm>
-          <a:off x="0" y="0"/>
-          <a:ext cx="0" cy="0"/>
-          <a:chOff x="0" y="0"/>
-          <a:chExt cx="0" cy="0"/>
-        </a:xfrm>
-      </p:grpSpPr>
-      <p:sp>
-        <p:nvSpPr>
-          <p:cNvPr id="3" name="Rectangle 2">
-            <a:extLst>
-              <a:ext uri="{FF2B5EF4-FFF2-40B4-BE49-F238E27FC236}">
-                <a16:creationId xmlns:a16="http://schemas.microsoft.com/office/drawing/2014/main" id="{2E8E3367-571F-486C-80AB-043BF71E1C3E}"/>
-              </a:ext>
-            </a:extLst>
-          </p:cNvPr>
-          <p:cNvSpPr/>
-          <p:nvPr/>
-        </p:nvSpPr>
-        <p:spPr>
-          <a:xfrm>
-            <a:off x="705853" y="465221"/>
-            <a:ext cx="10780295" cy="5927558"/>
-          </a:xfrm>
-          <a:prstGeom prst="rect">
-            <a:avLst/>
-          </a:prstGeom>
-          <a:noFill/>
-          <a:ln w="57150">
-            <a:solidFill>
-              <a:srgbClr val="FFC000"/>
-            </a:solidFill>
-          </a:ln>
-        </p:spPr>
-        <p:style>
-          <a:lnRef idx="2">
-            <a:schemeClr val="accent1">
-              <a:shade val="50000"/>
-            </a:schemeClr>
-          </a:lnRef>
-          <a:fillRef idx="1">
-            <a:schemeClr val="accent1"/>
-          </a:fillRef>
-          <a:effectRef idx="0">
-            <a:schemeClr val="accent1"/>
-          </a:effectRef>
-          <a:fontRef idx="minor">
-            <a:schemeClr val="lt1"/>
-          </a:fontRef>
-        </p:style>
-        <p:txBody>
-          <a:bodyPr rtlCol="0" anchor="ctr"/>
-          <a:lstStyle/>
-          <a:p>
-            <a:pPr algn="ctr"/>
-            <a:endParaRPr lang="fr-FR">
-              <a:latin typeface="Roboto Light" panose="02000000000000000000" pitchFamily="2" charset="0"/>
-              <a:ea typeface="Roboto Light" panose="02000000000000000000" pitchFamily="2" charset="0"/>
-            </a:endParaRPr>
-          </a:p>
-        </p:txBody>
-      </p:sp>
-      <p:sp>
-        <p:nvSpPr>
-          <p:cNvPr id="2" name="Titre 1">
-            <a:extLst>
-              <a:ext uri="{FF2B5EF4-FFF2-40B4-BE49-F238E27FC236}">
-                <a16:creationId xmlns:a16="http://schemas.microsoft.com/office/drawing/2014/main" id="{D738593F-B18F-4600-AF47-F18EDBE0844C}"/>
+      <p:sp>
+        <p:nvSpPr>
+          <p:cNvPr id="6" name="Titre 1">
+            <a:extLst>
+              <a:ext uri="{FF2B5EF4-FFF2-40B4-BE49-F238E27FC236}">
+                <a16:creationId xmlns:a16="http://schemas.microsoft.com/office/drawing/2014/main" id="{89D2DC52-B5F0-43B6-9E15-713C72CE41B8}"/>
               </a:ext>
             </a:extLst>
           </p:cNvPr>
@@ -6648,8 +6264,8 @@
         </p:nvSpPr>
         <p:spPr>
           <a:xfrm>
-            <a:off x="1174531" y="947929"/>
-            <a:ext cx="5489028" cy="2646609"/>
+            <a:off x="705849" y="433319"/>
+            <a:ext cx="10780295" cy="2646609"/>
           </a:xfrm>
         </p:spPr>
         <p:txBody>
@@ -6660,292 +6276,19 @@
           <a:p>
             <a:pPr algn="ctr"/>
             <a:r>
-              <a:rPr lang="fr-FR" sz="6600" dirty="0">
+              <a:rPr lang="fr-FR" dirty="0">
                 <a:latin typeface="Roboto" panose="02000000000000000000" pitchFamily="2" charset="0"/>
                 <a:ea typeface="Roboto" panose="02000000000000000000" pitchFamily="2" charset="0"/>
               </a:rPr>
-              <a:t>Merci.</a:t>
+              <a:t>Merci d’avoir utilisé notre guichet automatique</a:t>
             </a:r>
-            <a:br>
-              <a:rPr lang="fr-FR" sz="6600" dirty="0">
-                <a:latin typeface="Roboto" panose="02000000000000000000" pitchFamily="2" charset="0"/>
-                <a:ea typeface="Roboto" panose="02000000000000000000" pitchFamily="2" charset="0"/>
-              </a:rPr>
-            </a:br>
-            <a:r>
-              <a:rPr lang="fr-FR" sz="6600" dirty="0">
-                <a:latin typeface="Roboto" panose="02000000000000000000" pitchFamily="2" charset="0"/>
-                <a:ea typeface="Roboto" panose="02000000000000000000" pitchFamily="2" charset="0"/>
-              </a:rPr>
-              <a:t>À bientôt.</a:t>
-            </a:r>
-          </a:p>
-        </p:txBody>
-      </p:sp>
-      <p:sp>
-        <p:nvSpPr>
-          <p:cNvPr id="4" name="ZoneTexte 3">
-            <a:extLst>
-              <a:ext uri="{FF2B5EF4-FFF2-40B4-BE49-F238E27FC236}">
-                <a16:creationId xmlns:a16="http://schemas.microsoft.com/office/drawing/2014/main" id="{5B2C0825-ABD4-4F7B-8EA3-9F95BAA7C9AC}"/>
-              </a:ext>
-            </a:extLst>
-          </p:cNvPr>
-          <p:cNvSpPr txBox="1"/>
-          <p:nvPr/>
-        </p:nvSpPr>
-        <p:spPr>
-          <a:xfrm>
-            <a:off x="705853" y="63987"/>
-            <a:ext cx="1229824" cy="369332"/>
-          </a:xfrm>
-          <a:prstGeom prst="rect">
-            <a:avLst/>
-          </a:prstGeom>
-          <a:noFill/>
-        </p:spPr>
-        <p:txBody>
-          <a:bodyPr wrap="none" rtlCol="0">
-            <a:spAutoFit/>
-          </a:bodyPr>
-          <a:lstStyle/>
-          <a:p>
-            <a:r>
-              <a:rPr lang="fr-FR" dirty="0">
-                <a:latin typeface="Roboto Light" panose="02000000000000000000" pitchFamily="2" charset="0"/>
-                <a:ea typeface="Roboto Light" panose="02000000000000000000" pitchFamily="2" charset="0"/>
-              </a:rPr>
-              <a:t>Ecran : Fin</a:t>
-            </a:r>
-          </a:p>
-        </p:txBody>
-      </p:sp>
-      <p:pic>
-        <p:nvPicPr>
-          <p:cNvPr id="6" name="Graphique 5">
-            <a:extLst>
-              <a:ext uri="{FF2B5EF4-FFF2-40B4-BE49-F238E27FC236}">
-                <a16:creationId xmlns:a16="http://schemas.microsoft.com/office/drawing/2014/main" id="{27A28B33-C2CB-4851-8F3E-4444D0BA86AC}"/>
-              </a:ext>
-            </a:extLst>
-          </p:cNvPr>
-          <p:cNvPicPr>
-            <a:picLocks noChangeAspect="1"/>
-          </p:cNvPicPr>
-          <p:nvPr/>
-        </p:nvPicPr>
-        <p:blipFill>
-          <a:blip r:embed="rId2">
-            <a:extLst>
-              <a:ext uri="{28A0092B-C50C-407E-A947-70E740481C1C}">
-                <a14:useLocalDpi xmlns:a14="http://schemas.microsoft.com/office/drawing/2010/main" val="0"/>
-              </a:ext>
-              <a:ext uri="{96DAC541-7B7A-43D3-8B79-37D633B846F1}">
-                <asvg:svgBlip xmlns:asvg="http://schemas.microsoft.com/office/drawing/2016/SVG/main" r:embed="rId3"/>
-              </a:ext>
-            </a:extLst>
-          </a:blip>
-          <a:stretch>
-            <a:fillRect/>
-          </a:stretch>
-        </p:blipFill>
-        <p:spPr>
-          <a:xfrm>
-            <a:off x="7893269" y="2766219"/>
-            <a:ext cx="2942897" cy="2942897"/>
-          </a:xfrm>
-          <a:prstGeom prst="rect">
-            <a:avLst/>
-          </a:prstGeom>
-        </p:spPr>
-      </p:pic>
+          </a:p>
+        </p:txBody>
+      </p:sp>
     </p:spTree>
     <p:extLst>
       <p:ext uri="{BB962C8B-B14F-4D97-AF65-F5344CB8AC3E}">
-        <p14:creationId xmlns:p14="http://schemas.microsoft.com/office/powerpoint/2010/main" val="905477408"/>
-      </p:ext>
-    </p:extLst>
-  </p:cSld>
-  <p:clrMapOvr>
-    <a:masterClrMapping/>
-  </p:clrMapOvr>
-</p:sld>
-</file>
-
-<file path=ppt/slides/slide19.xml><?xml version="1.0" encoding="utf-8"?>
-<p:sld xmlns:a="http://schemas.openxmlformats.org/drawingml/2006/main" xmlns:r="http://schemas.openxmlformats.org/officeDocument/2006/relationships" xmlns:p="http://schemas.openxmlformats.org/presentationml/2006/main">
-  <p:cSld>
-    <p:bg>
-      <p:bgPr>
-        <a:solidFill>
-          <a:schemeClr val="bg1"/>
-        </a:solidFill>
-        <a:effectLst/>
-      </p:bgPr>
-    </p:bg>
-    <p:spTree>
-      <p:nvGrpSpPr>
-        <p:cNvPr id="1" name=""/>
-        <p:cNvGrpSpPr/>
-        <p:nvPr/>
-      </p:nvGrpSpPr>
-      <p:grpSpPr>
-        <a:xfrm>
-          <a:off x="0" y="0"/>
-          <a:ext cx="0" cy="0"/>
-          <a:chOff x="0" y="0"/>
-          <a:chExt cx="0" cy="0"/>
-        </a:xfrm>
-      </p:grpSpPr>
-      <p:sp>
-        <p:nvSpPr>
-          <p:cNvPr id="20" name="Rectangle 19">
-            <a:extLst>
-              <a:ext uri="{FF2B5EF4-FFF2-40B4-BE49-F238E27FC236}">
-                <a16:creationId xmlns:a16="http://schemas.microsoft.com/office/drawing/2014/main" id="{7CA0DAA6-33B8-4A25-810D-2F4D816FB40E}"/>
-              </a:ext>
-              <a:ext uri="{C183D7F6-B498-43B3-948B-1728B52AA6E4}">
-                <adec:decorative xmlns:adec="http://schemas.microsoft.com/office/drawing/2017/decorative" val="1"/>
-              </a:ext>
-            </a:extLst>
-          </p:cNvPr>
-          <p:cNvSpPr>
-            <a:spLocks noGrp="1" noRot="1" noChangeAspect="1" noMove="1" noResize="1" noEditPoints="1" noAdjustHandles="1" noChangeArrowheads="1" noChangeShapeType="1" noTextEdit="1"/>
-          </p:cNvSpPr>
-          <p:nvPr>
-            <p:extLst>
-              <p:ext uri="{386F3935-93C4-4BCD-93E2-E3B085C9AB24}">
-                <p16:designElem xmlns:p16="http://schemas.microsoft.com/office/powerpoint/2015/main" val="1"/>
-              </p:ext>
-            </p:extLst>
-          </p:nvPr>
-        </p:nvSpPr>
-        <p:spPr bwMode="white">
-          <a:xfrm>
-            <a:off x="0" y="0"/>
-            <a:ext cx="4654297" cy="6858000"/>
-          </a:xfrm>
-          <a:prstGeom prst="rect">
-            <a:avLst/>
-          </a:prstGeom>
-          <a:solidFill>
-            <a:schemeClr val="tx1">
-              <a:lumMod val="85000"/>
-              <a:lumOff val="15000"/>
-            </a:schemeClr>
-          </a:solidFill>
-          <a:ln>
-            <a:noFill/>
-          </a:ln>
-        </p:spPr>
-        <p:style>
-          <a:lnRef idx="2">
-            <a:schemeClr val="accent1">
-              <a:shade val="50000"/>
-            </a:schemeClr>
-          </a:lnRef>
-          <a:fillRef idx="1">
-            <a:schemeClr val="accent1"/>
-          </a:fillRef>
-          <a:effectRef idx="0">
-            <a:schemeClr val="accent1"/>
-          </a:effectRef>
-          <a:fontRef idx="minor">
-            <a:schemeClr val="lt1"/>
-          </a:fontRef>
-        </p:style>
-        <p:txBody>
-          <a:bodyPr rtlCol="0" anchor="ctr"/>
-          <a:lstStyle/>
-          <a:p>
-            <a:pPr algn="ctr"/>
-            <a:endParaRPr lang="en-US"/>
-          </a:p>
-        </p:txBody>
-      </p:sp>
-      <p:sp>
-        <p:nvSpPr>
-          <p:cNvPr id="2" name="Titre 1">
-            <a:extLst>
-              <a:ext uri="{FF2B5EF4-FFF2-40B4-BE49-F238E27FC236}">
-                <a16:creationId xmlns:a16="http://schemas.microsoft.com/office/drawing/2014/main" id="{2FA96657-529C-473C-957B-A467E0C7BC5B}"/>
-              </a:ext>
-            </a:extLst>
-          </p:cNvPr>
-          <p:cNvSpPr>
-            <a:spLocks noGrp="1"/>
-          </p:cNvSpPr>
-          <p:nvPr>
-            <p:ph type="title"/>
-          </p:nvPr>
-        </p:nvSpPr>
-        <p:spPr>
-          <a:xfrm>
-            <a:off x="651307" y="640081"/>
-            <a:ext cx="3377183" cy="3681976"/>
-          </a:xfrm>
-          <a:noFill/>
-        </p:spPr>
-        <p:txBody>
-          <a:bodyPr vert="horz" lIns="91440" tIns="45720" rIns="91440" bIns="45720" rtlCol="0" anchor="b">
-            <a:normAutofit/>
-          </a:bodyPr>
-          <a:lstStyle/>
-          <a:p>
-            <a:r>
-              <a:rPr lang="en-US" kern="1200">
-                <a:solidFill>
-                  <a:schemeClr val="bg1"/>
-                </a:solidFill>
-                <a:latin typeface="+mj-lt"/>
-                <a:ea typeface="+mj-ea"/>
-                <a:cs typeface="+mj-cs"/>
-              </a:rPr>
-              <a:t>Diagramme de navigabilité</a:t>
-            </a:r>
-          </a:p>
-        </p:txBody>
-      </p:sp>
-      <p:pic>
-        <p:nvPicPr>
-          <p:cNvPr id="4" name="Image 3">
-            <a:extLst>
-              <a:ext uri="{FF2B5EF4-FFF2-40B4-BE49-F238E27FC236}">
-                <a16:creationId xmlns:a16="http://schemas.microsoft.com/office/drawing/2014/main" id="{7111A0D6-28A1-40DD-A522-9C1ACE601C41}"/>
-              </a:ext>
-            </a:extLst>
-          </p:cNvPr>
-          <p:cNvPicPr>
-            <a:picLocks noChangeAspect="1"/>
-          </p:cNvPicPr>
-          <p:nvPr/>
-        </p:nvPicPr>
-        <p:blipFill>
-          <a:blip r:embed="rId2">
-            <a:extLst>
-              <a:ext uri="{28A0092B-C50C-407E-A947-70E740481C1C}">
-                <a14:useLocalDpi xmlns:a14="http://schemas.microsoft.com/office/drawing/2010/main" val="0"/>
-              </a:ext>
-            </a:extLst>
-          </a:blip>
-          <a:stretch>
-            <a:fillRect/>
-          </a:stretch>
-        </p:blipFill>
-        <p:spPr>
-          <a:xfrm>
-            <a:off x="4669287" y="0"/>
-            <a:ext cx="7486477" cy="6858000"/>
-          </a:xfrm>
-          <a:prstGeom prst="rect">
-            <a:avLst/>
-          </a:prstGeom>
-        </p:spPr>
-      </p:pic>
-    </p:spTree>
-    <p:extLst>
-      <p:ext uri="{BB962C8B-B14F-4D97-AF65-F5344CB8AC3E}">
-        <p14:creationId xmlns:p14="http://schemas.microsoft.com/office/powerpoint/2010/main" val="3445554050"/>
+        <p14:creationId xmlns:p14="http://schemas.microsoft.com/office/powerpoint/2010/main" val="3275419602"/>
       </p:ext>
     </p:extLst>
   </p:cSld>

</xml_diff>